<commit_message>
Added content. Needs work.
</commit_message>
<xml_diff>
--- a/trunk/docs/TeamFE-ArchPresentation.pptx
+++ b/trunk/docs/TeamFE-ArchPresentation.pptx
@@ -109,7 +109,16 @@
       </a:defRPr>
     </a:lvl9pPr>
   </p:defaultTextStyle>
+  <p:extLst>
+    <p:ext uri="{EFAFB233-063F-42B5-8137-9DF3F51BA10A}">
+      <p15:sldGuideLst xmlns:p15="http://schemas.microsoft.com/office/powerpoint/2012/main"/>
+    </p:ext>
+  </p:extLst>
 </p:presentation>
+</file>
+
+<file path=ppt/revisionInfo.xml><?xml version="1.0" encoding="utf-8"?>
+<p1510:revInfo xmlns:a="http://schemas.openxmlformats.org/drawingml/2006/main" xmlns:r="http://schemas.openxmlformats.org/officeDocument/2006/relationships" xmlns:p1510="http://schemas.microsoft.com/office/powerpoint/2015/10/main"/>
 </file>
 
 <file path=ppt/changesInfos/changesInfo1.xml><?xml version="1.0" encoding="utf-8"?>
@@ -658,7 +667,7 @@
           <a:p>
             <a:fld id="{2D799662-88D0-4CED-9864-C2C5D3E3FDAB}" type="datetimeFigureOut">
               <a:rPr lang="en-US" smtClean="0"/>
-              <a:t>2018-04-04</a:t>
+              <a:t>4/4/2018</a:t>
             </a:fld>
             <a:endParaRPr lang="en-US"/>
           </a:p>
@@ -954,7 +963,7 @@
           <a:p>
             <a:fld id="{2D799662-88D0-4CED-9864-C2C5D3E3FDAB}" type="datetimeFigureOut">
               <a:rPr lang="en-US" smtClean="0"/>
-              <a:t>2018-04-04</a:t>
+              <a:t>4/4/2018</a:t>
             </a:fld>
             <a:endParaRPr lang="en-US"/>
           </a:p>
@@ -1202,7 +1211,7 @@
           <a:p>
             <a:fld id="{2D799662-88D0-4CED-9864-C2C5D3E3FDAB}" type="datetimeFigureOut">
               <a:rPr lang="en-US" smtClean="0"/>
-              <a:t>2018-04-04</a:t>
+              <a:t>4/4/2018</a:t>
             </a:fld>
             <a:endParaRPr lang="en-US"/>
           </a:p>
@@ -1742,7 +1751,7 @@
           <a:p>
             <a:fld id="{2D799662-88D0-4CED-9864-C2C5D3E3FDAB}" type="datetimeFigureOut">
               <a:rPr lang="en-US" smtClean="0"/>
-              <a:t>2018-04-04</a:t>
+              <a:t>4/4/2018</a:t>
             </a:fld>
             <a:endParaRPr lang="en-US"/>
           </a:p>
@@ -1990,7 +1999,7 @@
           <a:p>
             <a:fld id="{2D799662-88D0-4CED-9864-C2C5D3E3FDAB}" type="datetimeFigureOut">
               <a:rPr lang="en-US" smtClean="0"/>
-              <a:t>2018-04-04</a:t>
+              <a:t>4/4/2018</a:t>
             </a:fld>
             <a:endParaRPr lang="en-US"/>
           </a:p>
@@ -2522,7 +2531,7 @@
           <a:p>
             <a:fld id="{2D799662-88D0-4CED-9864-C2C5D3E3FDAB}" type="datetimeFigureOut">
               <a:rPr lang="en-US" smtClean="0"/>
-              <a:t>2018-04-04</a:t>
+              <a:t>4/4/2018</a:t>
             </a:fld>
             <a:endParaRPr lang="en-US"/>
           </a:p>
@@ -2819,7 +2828,7 @@
           <a:p>
             <a:fld id="{2D799662-88D0-4CED-9864-C2C5D3E3FDAB}" type="datetimeFigureOut">
               <a:rPr lang="en-US" smtClean="0"/>
-              <a:t>2018-04-04</a:t>
+              <a:t>4/4/2018</a:t>
             </a:fld>
             <a:endParaRPr lang="en-US"/>
           </a:p>
@@ -2993,7 +3002,7 @@
           <a:p>
             <a:fld id="{2D799662-88D0-4CED-9864-C2C5D3E3FDAB}" type="datetimeFigureOut">
               <a:rPr lang="en-US" smtClean="0"/>
-              <a:t>2018-04-04</a:t>
+              <a:t>4/4/2018</a:t>
             </a:fld>
             <a:endParaRPr lang="en-US"/>
           </a:p>
@@ -3173,7 +3182,7 @@
           <a:p>
             <a:fld id="{2D799662-88D0-4CED-9864-C2C5D3E3FDAB}" type="datetimeFigureOut">
               <a:rPr lang="en-US" smtClean="0"/>
-              <a:t>2018-04-04</a:t>
+              <a:t>4/4/2018</a:t>
             </a:fld>
             <a:endParaRPr lang="en-US"/>
           </a:p>
@@ -3343,7 +3352,7 @@
           <a:p>
             <a:fld id="{2D799662-88D0-4CED-9864-C2C5D3E3FDAB}" type="datetimeFigureOut">
               <a:rPr lang="en-US" smtClean="0"/>
-              <a:t>2018-04-04</a:t>
+              <a:t>4/4/2018</a:t>
             </a:fld>
             <a:endParaRPr lang="en-US"/>
           </a:p>
@@ -3594,7 +3603,7 @@
           <a:p>
             <a:fld id="{2D799662-88D0-4CED-9864-C2C5D3E3FDAB}" type="datetimeFigureOut">
               <a:rPr lang="en-US" smtClean="0"/>
-              <a:t>2018-04-04</a:t>
+              <a:t>4/4/2018</a:t>
             </a:fld>
             <a:endParaRPr lang="en-US"/>
           </a:p>
@@ -3891,7 +3900,7 @@
           <a:p>
             <a:fld id="{2D799662-88D0-4CED-9864-C2C5D3E3FDAB}" type="datetimeFigureOut">
               <a:rPr lang="en-US" smtClean="0"/>
-              <a:t>2018-04-04</a:t>
+              <a:t>4/4/2018</a:t>
             </a:fld>
             <a:endParaRPr lang="en-US"/>
           </a:p>
@@ -4333,7 +4342,7 @@
           <a:p>
             <a:fld id="{2D799662-88D0-4CED-9864-C2C5D3E3FDAB}" type="datetimeFigureOut">
               <a:rPr lang="en-US" smtClean="0"/>
-              <a:t>2018-04-04</a:t>
+              <a:t>4/4/2018</a:t>
             </a:fld>
             <a:endParaRPr lang="en-US"/>
           </a:p>
@@ -4451,7 +4460,7 @@
           <a:p>
             <a:fld id="{2D799662-88D0-4CED-9864-C2C5D3E3FDAB}" type="datetimeFigureOut">
               <a:rPr lang="en-US" smtClean="0"/>
-              <a:t>2018-04-04</a:t>
+              <a:t>4/4/2018</a:t>
             </a:fld>
             <a:endParaRPr lang="en-US"/>
           </a:p>
@@ -4546,7 +4555,7 @@
           <a:p>
             <a:fld id="{2D799662-88D0-4CED-9864-C2C5D3E3FDAB}" type="datetimeFigureOut">
               <a:rPr lang="en-US" smtClean="0"/>
-              <a:t>2018-04-04</a:t>
+              <a:t>4/4/2018</a:t>
             </a:fld>
             <a:endParaRPr lang="en-US"/>
           </a:p>
@@ -4829,7 +4838,7 @@
           <a:p>
             <a:fld id="{2D799662-88D0-4CED-9864-C2C5D3E3FDAB}" type="datetimeFigureOut">
               <a:rPr lang="en-US" smtClean="0"/>
-              <a:t>2018-04-04</a:t>
+              <a:t>4/4/2018</a:t>
             </a:fld>
             <a:endParaRPr lang="en-US"/>
           </a:p>
@@ -5120,7 +5129,7 @@
           <a:p>
             <a:fld id="{2D799662-88D0-4CED-9864-C2C5D3E3FDAB}" type="datetimeFigureOut">
               <a:rPr lang="en-US" smtClean="0"/>
-              <a:t>2018-04-04</a:t>
+              <a:t>4/4/2018</a:t>
             </a:fld>
             <a:endParaRPr lang="en-US"/>
           </a:p>
@@ -5650,7 +5659,7 @@
           <a:p>
             <a:fld id="{2D799662-88D0-4CED-9864-C2C5D3E3FDAB}" type="datetimeFigureOut">
               <a:rPr lang="en-US" smtClean="0"/>
-              <a:t>2018-04-04</a:t>
+              <a:t>4/4/2018</a:t>
             </a:fld>
             <a:endParaRPr lang="en-US"/>
           </a:p>
@@ -6243,23 +6252,7 @@
                   <a:srgbClr val="00B0F0"/>
                 </a:solidFill>
               </a:rPr>
-              <a:t>Team members: Sanford Johnston, Jacob Espinoza, Lucas </a:t>
-            </a:r>
-            <a:r>
-              <a:rPr lang="en-US" dirty="0" err="1">
-                <a:solidFill>
-                  <a:srgbClr val="00B0F0"/>
-                </a:solidFill>
-              </a:rPr>
-              <a:t>Herrman</a:t>
-            </a:r>
-            <a:r>
-              <a:rPr lang="en-US" dirty="0">
-                <a:solidFill>
-                  <a:srgbClr val="00B0F0"/>
-                </a:solidFill>
-              </a:rPr>
-              <a:t>, Isaias </a:t>
+              <a:t>Team members: Sanford Johnston, Jacob Espinoza, Lucas Hermann, Isaias </a:t>
             </a:r>
             <a:r>
               <a:rPr lang="en-US" dirty="0" err="1">
@@ -6363,13 +6356,140 @@
           </a:xfrm>
         </p:spPr>
         <p:txBody>
-          <a:bodyPr anchor="t"/>
+          <a:bodyPr anchor="t">
+            <a:normAutofit fontScale="85000" lnSpcReduction="20000"/>
+          </a:bodyPr>
           <a:lstStyle/>
           <a:p>
             <a:r>
               <a:rPr lang="en-US" dirty="0"/>
-              <a:t>Add information here : give a short overview of the project</a:t>
-            </a:r>
+              <a:t>Purpose: Update common tags once for a set of products </a:t>
+            </a:r>
+          </a:p>
+          <a:p>
+            <a:r>
+              <a:rPr lang="en-US" dirty="0"/>
+              <a:t>The Metadata Tool will operate in Sessions. </a:t>
+            </a:r>
+          </a:p>
+          <a:p>
+            <a:pPr lvl="1"/>
+            <a:r>
+              <a:rPr lang="en-US" dirty="0"/>
+              <a:t>new/open/save Sessions</a:t>
+            </a:r>
+          </a:p>
+          <a:p>
+            <a:pPr lvl="1"/>
+            <a:r>
+              <a:rPr lang="en-US" dirty="0"/>
+              <a:t>Import (append Table of Contents) </a:t>
+            </a:r>
+          </a:p>
+          <a:p>
+            <a:pPr lvl="1"/>
+            <a:r>
+              <a:rPr lang="en-US" dirty="0"/>
+              <a:t>Export (XML files for all data products)</a:t>
+            </a:r>
+          </a:p>
+          <a:p>
+            <a:pPr lvl="1"/>
+            <a:r>
+              <a:rPr lang="en-US" dirty="0"/>
+              <a:t>Main view:</a:t>
+            </a:r>
+          </a:p>
+          <a:p>
+            <a:pPr lvl="2"/>
+            <a:r>
+              <a:rPr lang="en-US" dirty="0"/>
+              <a:t>Table of Contents tree</a:t>
+            </a:r>
+          </a:p>
+          <a:p>
+            <a:pPr lvl="3"/>
+            <a:r>
+              <a:rPr lang="en-US" dirty="0"/>
+              <a:t>Jump to an Element in the tree</a:t>
+            </a:r>
+          </a:p>
+          <a:p>
+            <a:pPr lvl="3"/>
+            <a:r>
+              <a:rPr lang="en-US" dirty="0"/>
+              <a:t>Progress visual ques</a:t>
+            </a:r>
+          </a:p>
+          <a:p>
+            <a:pPr lvl="4"/>
+            <a:r>
+              <a:rPr lang="en-US" dirty="0">
+                <a:solidFill>
+                  <a:srgbClr val="FF0000"/>
+                </a:solidFill>
+              </a:rPr>
+              <a:t>Empty Elements needing input </a:t>
+            </a:r>
+          </a:p>
+          <a:p>
+            <a:pPr lvl="4"/>
+            <a:r>
+              <a:rPr lang="en-US" dirty="0">
+                <a:solidFill>
+                  <a:schemeClr val="accent3">
+                    <a:lumMod val="75000"/>
+                  </a:schemeClr>
+                </a:solidFill>
+              </a:rPr>
+              <a:t>Elements with content but unverified</a:t>
+            </a:r>
+            <a:endParaRPr lang="en-US" dirty="0"/>
+          </a:p>
+          <a:p>
+            <a:pPr lvl="4"/>
+            <a:r>
+              <a:rPr lang="en-US" dirty="0">
+                <a:solidFill>
+                  <a:schemeClr val="accent2">
+                    <a:lumMod val="50000"/>
+                  </a:schemeClr>
+                </a:solidFill>
+              </a:rPr>
+              <a:t>Elements verified to be correct</a:t>
+            </a:r>
+            <a:endParaRPr lang="en-US" dirty="0"/>
+          </a:p>
+          <a:p>
+            <a:pPr lvl="2"/>
+            <a:r>
+              <a:rPr lang="en-US" dirty="0"/>
+              <a:t>Question/Answer/Verify</a:t>
+            </a:r>
+          </a:p>
+          <a:p>
+            <a:pPr lvl="3"/>
+            <a:r>
+              <a:rPr lang="en-US" dirty="0"/>
+              <a:t>Previous/next - modify Element contents in order</a:t>
+            </a:r>
+          </a:p>
+          <a:p>
+            <a:pPr lvl="3"/>
+            <a:r>
+              <a:rPr lang="en-US" dirty="0"/>
+              <a:t>Saves automatically</a:t>
+            </a:r>
+            <a:endParaRPr lang="en-US" dirty="0">
+              <a:solidFill>
+                <a:schemeClr val="accent2">
+                  <a:lumMod val="50000"/>
+                </a:schemeClr>
+              </a:solidFill>
+            </a:endParaRPr>
+          </a:p>
+          <a:p>
+            <a:endParaRPr lang="en-US" dirty="0"/>
           </a:p>
         </p:txBody>
       </p:sp>
@@ -6464,7 +6584,48 @@
           <a:p>
             <a:r>
               <a:rPr lang="en-US" dirty="0"/>
-              <a:t>Add information here : “What requirements were essential in driving your architecture decision?”</a:t>
+              <a:t>Maintain the tree integrity of the metadata templates</a:t>
+            </a:r>
+          </a:p>
+          <a:p>
+            <a:pPr lvl="1"/>
+            <a:r>
+              <a:rPr lang="en-US" dirty="0"/>
+              <a:t>Duplicate tags containing identical information for all data products need to not be duplicated in the Table of Contents</a:t>
+            </a:r>
+          </a:p>
+          <a:p>
+            <a:pPr lvl="1"/>
+            <a:r>
+              <a:rPr lang="en-US" dirty="0"/>
+              <a:t>Duplicate  tags that have unique information for a product need to appear in the Table of Contents with a unique identifier and treated carefully on export</a:t>
+            </a:r>
+          </a:p>
+          <a:p>
+            <a:r>
+              <a:rPr lang="en-US" dirty="0"/>
+              <a:t>Program behavior and flow</a:t>
+            </a:r>
+          </a:p>
+          <a:p>
+            <a:pPr lvl="1"/>
+            <a:r>
+              <a:rPr lang="en-US" dirty="0"/>
+              <a:t>Users need a visual queue to know the status of each element in the Table of Contents (empty, updated, verified)</a:t>
+            </a:r>
+          </a:p>
+          <a:p>
+            <a:pPr lvl="1"/>
+            <a:r>
+              <a:rPr lang="en-US" dirty="0"/>
+              <a:t>Ask a question, record the answer (a sort of wizard)</a:t>
+            </a:r>
+          </a:p>
+          <a:p>
+            <a:pPr lvl="1"/>
+            <a:r>
+              <a:rPr lang="en-US" dirty="0"/>
+              <a:t>Fewest commands possible</a:t>
             </a:r>
           </a:p>
         </p:txBody>
@@ -6555,12 +6716,78 @@
           </a:xfrm>
         </p:spPr>
         <p:txBody>
-          <a:bodyPr anchor="t"/>
+          <a:bodyPr anchor="t">
+            <a:normAutofit lnSpcReduction="10000"/>
+          </a:bodyPr>
           <a:lstStyle/>
           <a:p>
             <a:r>
               <a:rPr lang="en-US" dirty="0"/>
-              <a:t>Add information here : “pick at least 2 architectural styles and state why they were candidates for your system; then state the one you chose.”</a:t>
+              <a:t>Repository </a:t>
+            </a:r>
+          </a:p>
+          <a:p>
+            <a:pPr lvl="1"/>
+            <a:r>
+              <a:rPr lang="en-US" dirty="0"/>
+              <a:t>Central data store of the metadata (Node Tree) and control of its elements</a:t>
+            </a:r>
+          </a:p>
+          <a:p>
+            <a:pPr lvl="1"/>
+            <a:r>
+              <a:rPr lang="en-US" dirty="0"/>
+              <a:t>Blackboard - some elements are reactive to updates to the tree (TOC, Main View) </a:t>
+            </a:r>
+          </a:p>
+          <a:p>
+            <a:pPr lvl="1"/>
+            <a:r>
+              <a:rPr lang="en-US" dirty="0"/>
+              <a:t>Display of knowledge sources in the form of Visual Queues</a:t>
+            </a:r>
+          </a:p>
+          <a:p>
+            <a:pPr lvl="1"/>
+            <a:r>
+              <a:rPr lang="en-US" dirty="0"/>
+              <a:t>Methods perform actions on data accessed from server (TOC) and are then written back to the data store (Node Tree).</a:t>
+            </a:r>
+          </a:p>
+          <a:p>
+            <a:r>
+              <a:rPr lang="en-US" dirty="0"/>
+              <a:t>Pipe and Filter </a:t>
+            </a:r>
+          </a:p>
+          <a:p>
+            <a:pPr lvl="1"/>
+            <a:r>
+              <a:rPr lang="en-US" dirty="0"/>
+              <a:t>Passing input data through a sequence of data transforming components. </a:t>
+            </a:r>
+          </a:p>
+          <a:p>
+            <a:pPr lvl="1"/>
+            <a:r>
+              <a:rPr lang="en-US" dirty="0"/>
+              <a:t>Ideally, program use typically a linear flow through TOC elements. </a:t>
+            </a:r>
+          </a:p>
+          <a:p>
+            <a:pPr lvl="1"/>
+            <a:r>
+              <a:rPr lang="en-US" dirty="0"/>
+              <a:t>All actions on an element must preserve element data format</a:t>
+            </a:r>
+          </a:p>
+          <a:p>
+            <a:pPr marL="457200" lvl="1" indent="0" algn="ctr">
+              <a:buNone/>
+            </a:pPr>
+            <a:r>
+              <a:rPr lang="en-US" dirty="0"/>
+              <a:t>WINNER - Repository</a:t>
             </a:r>
           </a:p>
         </p:txBody>
@@ -6630,39 +6857,1737 @@
       </p:sp>
       <p:sp>
         <p:nvSpPr>
-          <p:cNvPr id="3" name="Content Placeholder 2">
+          <p:cNvPr id="104" name="Rectangle 103">
             <a:extLst>
               <a:ext uri="{FF2B5EF4-FFF2-40B4-BE49-F238E27FC236}">
-                <a16:creationId xmlns:a16="http://schemas.microsoft.com/office/drawing/2014/main" id="{136B68AD-0183-49E6-A4A1-A10CBF88EC1F}"/>
+                <a16:creationId xmlns:a16="http://schemas.microsoft.com/office/drawing/2014/main" id="{116C9126-7684-48C6-9F52-A3D46A302D71}"/>
               </a:ext>
             </a:extLst>
           </p:cNvPr>
-          <p:cNvSpPr>
-            <a:spLocks noGrp="1"/>
-          </p:cNvSpPr>
-          <p:nvPr>
-            <p:ph idx="1"/>
-          </p:nvPr>
+          <p:cNvSpPr/>
+          <p:nvPr/>
         </p:nvSpPr>
         <p:spPr>
           <a:xfrm>
-            <a:off x="1484310" y="1066801"/>
-            <a:ext cx="10018713" cy="4724400"/>
+            <a:off x="2944877" y="3076125"/>
+            <a:ext cx="914400" cy="914400"/>
           </a:xfrm>
+          <a:prstGeom prst="rect">
+            <a:avLst/>
+          </a:prstGeom>
+          <a:noFill/>
+          <a:ln w="25400">
+            <a:solidFill>
+              <a:srgbClr val="0000FF"/>
+            </a:solidFill>
+          </a:ln>
         </p:spPr>
-        <p:txBody>
-          <a:bodyPr anchor="t"/>
+        <p:style>
+          <a:lnRef idx="2">
+            <a:schemeClr val="accent1">
+              <a:shade val="50000"/>
+            </a:schemeClr>
+          </a:lnRef>
+          <a:fillRef idx="1">
+            <a:schemeClr val="accent1"/>
+          </a:fillRef>
+          <a:effectRef idx="0">
+            <a:schemeClr val="accent1"/>
+          </a:effectRef>
+          <a:fontRef idx="minor">
+            <a:schemeClr val="lt1"/>
+          </a:fontRef>
+        </p:style>
+        <p:txBody>
+          <a:bodyPr rtlCol="0" anchor="ctr"/>
+          <a:lstStyle/>
+          <a:p>
+            <a:pPr algn="ctr"/>
+            <a:r>
+              <a:rPr lang="en-US" sz="1200" dirty="0">
+                <a:solidFill>
+                  <a:schemeClr val="tx1"/>
+                </a:solidFill>
+              </a:rPr>
+              <a:t>Session</a:t>
+            </a:r>
+          </a:p>
+          <a:p>
+            <a:pPr algn="ctr"/>
+            <a:r>
+              <a:rPr lang="en-US" sz="1200" dirty="0">
+                <a:solidFill>
+                  <a:schemeClr val="tx1"/>
+                </a:solidFill>
+              </a:rPr>
+              <a:t>&lt;New&gt;</a:t>
+            </a:r>
+          </a:p>
+          <a:p>
+            <a:pPr algn="ctr"/>
+            <a:r>
+              <a:rPr lang="en-US" sz="1200" dirty="0">
+                <a:solidFill>
+                  <a:schemeClr val="tx1"/>
+                </a:solidFill>
+              </a:rPr>
+              <a:t>&lt;Open&gt;</a:t>
+            </a:r>
+          </a:p>
+          <a:p>
+            <a:pPr algn="ctr"/>
+            <a:r>
+              <a:rPr lang="en-US" sz="1200" dirty="0">
+                <a:solidFill>
+                  <a:schemeClr val="tx1"/>
+                </a:solidFill>
+              </a:rPr>
+              <a:t>&lt;Save&gt;</a:t>
+            </a:r>
+          </a:p>
+        </p:txBody>
+      </p:sp>
+      <p:sp>
+        <p:nvSpPr>
+          <p:cNvPr id="105" name="Rectangle 104">
+            <a:extLst>
+              <a:ext uri="{FF2B5EF4-FFF2-40B4-BE49-F238E27FC236}">
+                <a16:creationId xmlns:a16="http://schemas.microsoft.com/office/drawing/2014/main" id="{51A539E0-E8C9-4598-98F5-D382D27F759C}"/>
+              </a:ext>
+            </a:extLst>
+          </p:cNvPr>
+          <p:cNvSpPr/>
+          <p:nvPr/>
+        </p:nvSpPr>
+        <p:spPr>
+          <a:xfrm>
+            <a:off x="2944877" y="1842863"/>
+            <a:ext cx="914400" cy="914400"/>
+          </a:xfrm>
+          <a:prstGeom prst="rect">
+            <a:avLst/>
+          </a:prstGeom>
+          <a:noFill/>
+          <a:ln w="25400">
+            <a:solidFill>
+              <a:srgbClr val="0000FF"/>
+            </a:solidFill>
+          </a:ln>
+        </p:spPr>
+        <p:style>
+          <a:lnRef idx="2">
+            <a:schemeClr val="accent1">
+              <a:shade val="50000"/>
+            </a:schemeClr>
+          </a:lnRef>
+          <a:fillRef idx="1">
+            <a:schemeClr val="accent1"/>
+          </a:fillRef>
+          <a:effectRef idx="0">
+            <a:schemeClr val="accent1"/>
+          </a:effectRef>
+          <a:fontRef idx="minor">
+            <a:schemeClr val="lt1"/>
+          </a:fontRef>
+        </p:style>
+        <p:txBody>
+          <a:bodyPr rot="0" spcFirstLastPara="0" vertOverflow="overflow" horzOverflow="overflow" vert="horz" wrap="square" lIns="91440" tIns="45720" rIns="91440" bIns="45720" numCol="1" spcCol="0" rtlCol="0" fromWordArt="0" anchor="ctr" anchorCtr="0" forceAA="0" compatLnSpc="1">
+            <a:prstTxWarp prst="textNoShape">
+              <a:avLst/>
+            </a:prstTxWarp>
+            <a:noAutofit/>
+          </a:bodyPr>
+          <a:lstStyle/>
+          <a:p>
+            <a:pPr algn="ctr"/>
+            <a:r>
+              <a:rPr lang="en-US" sz="1200" dirty="0">
+                <a:solidFill>
+                  <a:schemeClr val="tx1"/>
+                </a:solidFill>
+              </a:rPr>
+              <a:t>Import XML</a:t>
+            </a:r>
+          </a:p>
+        </p:txBody>
+      </p:sp>
+      <p:sp>
+        <p:nvSpPr>
+          <p:cNvPr id="107" name="Rectangle 106">
+            <a:extLst>
+              <a:ext uri="{FF2B5EF4-FFF2-40B4-BE49-F238E27FC236}">
+                <a16:creationId xmlns:a16="http://schemas.microsoft.com/office/drawing/2014/main" id="{D8406CEF-25D6-456E-A171-66E841BD258E}"/>
+              </a:ext>
+            </a:extLst>
+          </p:cNvPr>
+          <p:cNvSpPr/>
+          <p:nvPr/>
+        </p:nvSpPr>
+        <p:spPr>
+          <a:xfrm>
+            <a:off x="2944877" y="4308049"/>
+            <a:ext cx="914400" cy="914400"/>
+          </a:xfrm>
+          <a:prstGeom prst="rect">
+            <a:avLst/>
+          </a:prstGeom>
+          <a:noFill/>
+          <a:ln w="25400">
+            <a:solidFill>
+              <a:srgbClr val="0000FF"/>
+            </a:solidFill>
+          </a:ln>
+        </p:spPr>
+        <p:style>
+          <a:lnRef idx="2">
+            <a:schemeClr val="accent1">
+              <a:shade val="50000"/>
+            </a:schemeClr>
+          </a:lnRef>
+          <a:fillRef idx="1">
+            <a:schemeClr val="accent1"/>
+          </a:fillRef>
+          <a:effectRef idx="0">
+            <a:schemeClr val="accent1"/>
+          </a:effectRef>
+          <a:fontRef idx="minor">
+            <a:schemeClr val="lt1"/>
+          </a:fontRef>
+        </p:style>
+        <p:txBody>
+          <a:bodyPr rot="0" spcFirstLastPara="0" vertOverflow="overflow" horzOverflow="overflow" vert="horz" wrap="square" lIns="91440" tIns="45720" rIns="91440" bIns="45720" numCol="1" spcCol="0" rtlCol="0" fromWordArt="0" anchor="ctr" anchorCtr="0" forceAA="0" compatLnSpc="1">
+            <a:prstTxWarp prst="textNoShape">
+              <a:avLst/>
+            </a:prstTxWarp>
+            <a:noAutofit/>
+          </a:bodyPr>
+          <a:lstStyle/>
+          <a:p>
+            <a:pPr algn="ctr"/>
+            <a:r>
+              <a:rPr lang="en-US" sz="1200" dirty="0">
+                <a:solidFill>
+                  <a:schemeClr val="tx1"/>
+                </a:solidFill>
+              </a:rPr>
+              <a:t>Export XML</a:t>
+            </a:r>
+          </a:p>
+        </p:txBody>
+      </p:sp>
+      <p:cxnSp>
+        <p:nvCxnSpPr>
+          <p:cNvPr id="109" name="Straight Arrow Connector 108">
+            <a:extLst>
+              <a:ext uri="{FF2B5EF4-FFF2-40B4-BE49-F238E27FC236}">
+                <a16:creationId xmlns:a16="http://schemas.microsoft.com/office/drawing/2014/main" id="{01F01D06-1B38-437B-8336-98EA537CD7E1}"/>
+              </a:ext>
+            </a:extLst>
+          </p:cNvPr>
+          <p:cNvCxnSpPr>
+            <a:stCxn id="105" idx="2"/>
+            <a:endCxn id="104" idx="0"/>
+          </p:cNvCxnSpPr>
+          <p:nvPr/>
+        </p:nvCxnSpPr>
+        <p:spPr>
+          <a:xfrm>
+            <a:off x="3402077" y="2757263"/>
+            <a:ext cx="0" cy="318862"/>
+          </a:xfrm>
+          <a:prstGeom prst="straightConnector1">
+            <a:avLst/>
+          </a:prstGeom>
+          <a:ln w="25400">
+            <a:solidFill>
+              <a:schemeClr val="tx1"/>
+            </a:solidFill>
+            <a:tailEnd type="stealth"/>
+          </a:ln>
+        </p:spPr>
+        <p:style>
+          <a:lnRef idx="1">
+            <a:schemeClr val="accent1"/>
+          </a:lnRef>
+          <a:fillRef idx="0">
+            <a:schemeClr val="accent1"/>
+          </a:fillRef>
+          <a:effectRef idx="0">
+            <a:schemeClr val="accent1"/>
+          </a:effectRef>
+          <a:fontRef idx="minor">
+            <a:schemeClr val="tx1"/>
+          </a:fontRef>
+        </p:style>
+      </p:cxnSp>
+      <p:cxnSp>
+        <p:nvCxnSpPr>
+          <p:cNvPr id="111" name="Straight Arrow Connector 110">
+            <a:extLst>
+              <a:ext uri="{FF2B5EF4-FFF2-40B4-BE49-F238E27FC236}">
+                <a16:creationId xmlns:a16="http://schemas.microsoft.com/office/drawing/2014/main" id="{3018D4F5-6B5B-49E5-819D-0A57F0DF6704}"/>
+              </a:ext>
+            </a:extLst>
+          </p:cNvPr>
+          <p:cNvCxnSpPr>
+            <a:stCxn id="104" idx="2"/>
+            <a:endCxn id="107" idx="0"/>
+          </p:cNvCxnSpPr>
+          <p:nvPr/>
+        </p:nvCxnSpPr>
+        <p:spPr>
+          <a:xfrm>
+            <a:off x="3402077" y="3990525"/>
+            <a:ext cx="0" cy="317524"/>
+          </a:xfrm>
+          <a:prstGeom prst="straightConnector1">
+            <a:avLst/>
+          </a:prstGeom>
+          <a:ln w="25400">
+            <a:solidFill>
+              <a:schemeClr val="tx1"/>
+            </a:solidFill>
+            <a:tailEnd type="stealth"/>
+          </a:ln>
+        </p:spPr>
+        <p:style>
+          <a:lnRef idx="1">
+            <a:schemeClr val="accent1"/>
+          </a:lnRef>
+          <a:fillRef idx="0">
+            <a:schemeClr val="accent1"/>
+          </a:fillRef>
+          <a:effectRef idx="0">
+            <a:schemeClr val="accent1"/>
+          </a:effectRef>
+          <a:fontRef idx="minor">
+            <a:schemeClr val="tx1"/>
+          </a:fontRef>
+        </p:style>
+      </p:cxnSp>
+      <p:sp>
+        <p:nvSpPr>
+          <p:cNvPr id="112" name="Rectangle 111">
+            <a:extLst>
+              <a:ext uri="{FF2B5EF4-FFF2-40B4-BE49-F238E27FC236}">
+                <a16:creationId xmlns:a16="http://schemas.microsoft.com/office/drawing/2014/main" id="{B7184764-0C17-44B5-9C7D-9C610385DFA4}"/>
+              </a:ext>
+            </a:extLst>
+          </p:cNvPr>
+          <p:cNvSpPr/>
+          <p:nvPr/>
+        </p:nvSpPr>
+        <p:spPr>
+          <a:xfrm>
+            <a:off x="8116376" y="3083903"/>
+            <a:ext cx="1074656" cy="914400"/>
+          </a:xfrm>
+          <a:prstGeom prst="rect">
+            <a:avLst/>
+          </a:prstGeom>
+          <a:noFill/>
+          <a:ln w="25400">
+            <a:solidFill>
+              <a:srgbClr val="0000FF"/>
+            </a:solidFill>
+          </a:ln>
+        </p:spPr>
+        <p:style>
+          <a:lnRef idx="2">
+            <a:schemeClr val="accent1">
+              <a:shade val="50000"/>
+            </a:schemeClr>
+          </a:lnRef>
+          <a:fillRef idx="1">
+            <a:schemeClr val="accent1"/>
+          </a:fillRef>
+          <a:effectRef idx="0">
+            <a:schemeClr val="accent1"/>
+          </a:effectRef>
+          <a:fontRef idx="minor">
+            <a:schemeClr val="lt1"/>
+          </a:fontRef>
+        </p:style>
+        <p:txBody>
+          <a:bodyPr rot="0" spcFirstLastPara="0" vertOverflow="overflow" horzOverflow="overflow" vert="horz" wrap="square" lIns="91440" tIns="45720" rIns="91440" bIns="45720" numCol="1" spcCol="0" rtlCol="0" fromWordArt="0" anchor="ctr" anchorCtr="0" forceAA="0" compatLnSpc="1">
+            <a:prstTxWarp prst="textNoShape">
+              <a:avLst/>
+            </a:prstTxWarp>
+            <a:noAutofit/>
+          </a:bodyPr>
+          <a:lstStyle/>
+          <a:p>
+            <a:pPr algn="ctr"/>
+            <a:r>
+              <a:rPr lang="en-US" sz="1200" dirty="0">
+                <a:solidFill>
+                  <a:schemeClr val="tx1"/>
+                </a:solidFill>
+              </a:rPr>
+              <a:t>Main View</a:t>
+            </a:r>
+          </a:p>
+          <a:p>
+            <a:pPr algn="ctr"/>
+            <a:r>
+              <a:rPr lang="en-US" sz="1200" dirty="0">
+                <a:solidFill>
+                  <a:schemeClr val="tx1"/>
+                </a:solidFill>
+              </a:rPr>
+              <a:t>&lt;</a:t>
+            </a:r>
+            <a:r>
+              <a:rPr lang="en-US" sz="1200" dirty="0" err="1">
+                <a:solidFill>
+                  <a:schemeClr val="tx1"/>
+                </a:solidFill>
+              </a:rPr>
+              <a:t>Quesiton</a:t>
+            </a:r>
+            <a:r>
+              <a:rPr lang="en-US" sz="1200" dirty="0">
+                <a:solidFill>
+                  <a:schemeClr val="tx1"/>
+                </a:solidFill>
+              </a:rPr>
+              <a:t>&gt;</a:t>
+            </a:r>
+          </a:p>
+          <a:p>
+            <a:pPr algn="ctr"/>
+            <a:r>
+              <a:rPr lang="en-US" sz="1200" dirty="0">
+                <a:solidFill>
+                  <a:schemeClr val="tx1"/>
+                </a:solidFill>
+              </a:rPr>
+              <a:t>&lt;Answer&gt;</a:t>
+            </a:r>
+          </a:p>
+          <a:p>
+            <a:pPr algn="ctr"/>
+            <a:r>
+              <a:rPr lang="en-US" sz="1200" dirty="0">
+                <a:solidFill>
+                  <a:schemeClr val="tx1"/>
+                </a:solidFill>
+              </a:rPr>
+              <a:t>&lt;Verified&gt;</a:t>
+            </a:r>
+          </a:p>
+        </p:txBody>
+      </p:sp>
+      <p:sp>
+        <p:nvSpPr>
+          <p:cNvPr id="113" name="Rectangle 112">
+            <a:extLst>
+              <a:ext uri="{FF2B5EF4-FFF2-40B4-BE49-F238E27FC236}">
+                <a16:creationId xmlns:a16="http://schemas.microsoft.com/office/drawing/2014/main" id="{6F08C23A-0216-4FC4-9B0C-2B683C84B0FF}"/>
+              </a:ext>
+            </a:extLst>
+          </p:cNvPr>
+          <p:cNvSpPr/>
+          <p:nvPr/>
+        </p:nvSpPr>
+        <p:spPr>
+          <a:xfrm>
+            <a:off x="4889985" y="3076125"/>
+            <a:ext cx="914400" cy="914400"/>
+          </a:xfrm>
+          <a:prstGeom prst="rect">
+            <a:avLst/>
+          </a:prstGeom>
+          <a:noFill/>
+          <a:ln w="25400">
+            <a:solidFill>
+              <a:srgbClr val="0000FF"/>
+            </a:solidFill>
+          </a:ln>
+        </p:spPr>
+        <p:style>
+          <a:lnRef idx="2">
+            <a:schemeClr val="accent1">
+              <a:shade val="50000"/>
+            </a:schemeClr>
+          </a:lnRef>
+          <a:fillRef idx="1">
+            <a:schemeClr val="accent1"/>
+          </a:fillRef>
+          <a:effectRef idx="0">
+            <a:schemeClr val="accent1"/>
+          </a:effectRef>
+          <a:fontRef idx="minor">
+            <a:schemeClr val="lt1"/>
+          </a:fontRef>
+        </p:style>
+        <p:txBody>
+          <a:bodyPr rot="0" spcFirstLastPara="0" vertOverflow="overflow" horzOverflow="overflow" vert="horz" wrap="square" lIns="91440" tIns="45720" rIns="91440" bIns="45720" numCol="1" spcCol="0" rtlCol="0" fromWordArt="0" anchor="ctr" anchorCtr="0" forceAA="0" compatLnSpc="1">
+            <a:prstTxWarp prst="textNoShape">
+              <a:avLst/>
+            </a:prstTxWarp>
+            <a:noAutofit/>
+          </a:bodyPr>
+          <a:lstStyle/>
+          <a:p>
+            <a:pPr algn="ctr"/>
+            <a:r>
+              <a:rPr lang="en-US" sz="1200" dirty="0">
+                <a:solidFill>
+                  <a:schemeClr val="tx1"/>
+                </a:solidFill>
+              </a:rPr>
+              <a:t>Tree of Nodes</a:t>
+            </a:r>
+          </a:p>
+        </p:txBody>
+      </p:sp>
+      <p:cxnSp>
+        <p:nvCxnSpPr>
+          <p:cNvPr id="115" name="Straight Arrow Connector 114">
+            <a:extLst>
+              <a:ext uri="{FF2B5EF4-FFF2-40B4-BE49-F238E27FC236}">
+                <a16:creationId xmlns:a16="http://schemas.microsoft.com/office/drawing/2014/main" id="{30C4E47A-2149-44B7-B566-1D6EDFBE7171}"/>
+              </a:ext>
+            </a:extLst>
+          </p:cNvPr>
+          <p:cNvCxnSpPr>
+            <a:cxnSpLocks/>
+            <a:stCxn id="113" idx="3"/>
+            <a:endCxn id="125" idx="1"/>
+          </p:cNvCxnSpPr>
+          <p:nvPr/>
+        </p:nvCxnSpPr>
+        <p:spPr>
+          <a:xfrm>
+            <a:off x="5804385" y="3533325"/>
+            <a:ext cx="658731" cy="7778"/>
+          </a:xfrm>
+          <a:prstGeom prst="straightConnector1">
+            <a:avLst/>
+          </a:prstGeom>
+          <a:ln w="25400">
+            <a:solidFill>
+              <a:schemeClr val="tx1"/>
+            </a:solidFill>
+            <a:prstDash val="dash"/>
+            <a:headEnd type="stealth"/>
+            <a:tailEnd type="none"/>
+          </a:ln>
+        </p:spPr>
+        <p:style>
+          <a:lnRef idx="1">
+            <a:schemeClr val="accent1"/>
+          </a:lnRef>
+          <a:fillRef idx="0">
+            <a:schemeClr val="accent1"/>
+          </a:fillRef>
+          <a:effectRef idx="0">
+            <a:schemeClr val="accent1"/>
+          </a:effectRef>
+          <a:fontRef idx="minor">
+            <a:schemeClr val="tx1"/>
+          </a:fontRef>
+        </p:style>
+      </p:cxnSp>
+      <p:cxnSp>
+        <p:nvCxnSpPr>
+          <p:cNvPr id="117" name="Straight Arrow Connector 116">
+            <a:extLst>
+              <a:ext uri="{FF2B5EF4-FFF2-40B4-BE49-F238E27FC236}">
+                <a16:creationId xmlns:a16="http://schemas.microsoft.com/office/drawing/2014/main" id="{A2EDE3CC-0542-4F5C-AC86-535B0B285916}"/>
+              </a:ext>
+            </a:extLst>
+          </p:cNvPr>
+          <p:cNvCxnSpPr>
+            <a:stCxn id="104" idx="3"/>
+            <a:endCxn id="113" idx="1"/>
+          </p:cNvCxnSpPr>
+          <p:nvPr/>
+        </p:nvCxnSpPr>
+        <p:spPr>
+          <a:xfrm>
+            <a:off x="3859277" y="3533325"/>
+            <a:ext cx="1030708" cy="0"/>
+          </a:xfrm>
+          <a:prstGeom prst="straightConnector1">
+            <a:avLst/>
+          </a:prstGeom>
+          <a:ln w="25400">
+            <a:solidFill>
+              <a:schemeClr val="tx1"/>
+            </a:solidFill>
+            <a:headEnd type="triangle"/>
+            <a:tailEnd type="triangle"/>
+          </a:ln>
+        </p:spPr>
+        <p:style>
+          <a:lnRef idx="1">
+            <a:schemeClr val="accent1"/>
+          </a:lnRef>
+          <a:fillRef idx="0">
+            <a:schemeClr val="accent1"/>
+          </a:fillRef>
+          <a:effectRef idx="0">
+            <a:schemeClr val="accent1"/>
+          </a:effectRef>
+          <a:fontRef idx="minor">
+            <a:schemeClr val="tx1"/>
+          </a:fontRef>
+        </p:style>
+      </p:cxnSp>
+      <p:sp>
+        <p:nvSpPr>
+          <p:cNvPr id="118" name="Rectangle 117">
+            <a:extLst>
+              <a:ext uri="{FF2B5EF4-FFF2-40B4-BE49-F238E27FC236}">
+                <a16:creationId xmlns:a16="http://schemas.microsoft.com/office/drawing/2014/main" id="{2FBAD905-2528-4F22-9B1F-EE7C4A57CCB6}"/>
+              </a:ext>
+            </a:extLst>
+          </p:cNvPr>
+          <p:cNvSpPr/>
+          <p:nvPr/>
+        </p:nvSpPr>
+        <p:spPr>
+          <a:xfrm>
+            <a:off x="4889985" y="1797183"/>
+            <a:ext cx="914400" cy="914400"/>
+          </a:xfrm>
+          <a:prstGeom prst="rect">
+            <a:avLst/>
+          </a:prstGeom>
+          <a:noFill/>
+          <a:ln w="25400">
+            <a:solidFill>
+              <a:srgbClr val="0000FF"/>
+            </a:solidFill>
+          </a:ln>
+        </p:spPr>
+        <p:style>
+          <a:lnRef idx="2">
+            <a:schemeClr val="accent1">
+              <a:shade val="50000"/>
+            </a:schemeClr>
+          </a:lnRef>
+          <a:fillRef idx="1">
+            <a:schemeClr val="accent1"/>
+          </a:fillRef>
+          <a:effectRef idx="0">
+            <a:schemeClr val="accent1"/>
+          </a:effectRef>
+          <a:fontRef idx="minor">
+            <a:schemeClr val="lt1"/>
+          </a:fontRef>
+        </p:style>
+        <p:txBody>
+          <a:bodyPr rot="0" spcFirstLastPara="0" vertOverflow="overflow" horzOverflow="overflow" vert="horz" wrap="square" lIns="91440" tIns="45720" rIns="91440" bIns="45720" numCol="1" spcCol="0" rtlCol="0" fromWordArt="0" anchor="ctr" anchorCtr="0" forceAA="0" compatLnSpc="1">
+            <a:prstTxWarp prst="textNoShape">
+              <a:avLst/>
+            </a:prstTxWarp>
+            <a:noAutofit/>
+          </a:bodyPr>
+          <a:lstStyle/>
+          <a:p>
+            <a:pPr algn="ctr"/>
+            <a:r>
+              <a:rPr lang="en-US" sz="1200" dirty="0">
+                <a:solidFill>
+                  <a:schemeClr val="tx1"/>
+                </a:solidFill>
+              </a:rPr>
+              <a:t>Preview</a:t>
+            </a:r>
+          </a:p>
+        </p:txBody>
+      </p:sp>
+      <p:cxnSp>
+        <p:nvCxnSpPr>
+          <p:cNvPr id="120" name="Straight Arrow Connector 119">
+            <a:extLst>
+              <a:ext uri="{FF2B5EF4-FFF2-40B4-BE49-F238E27FC236}">
+                <a16:creationId xmlns:a16="http://schemas.microsoft.com/office/drawing/2014/main" id="{99FF4CDE-0E88-4665-AA65-DF136A76AEC6}"/>
+              </a:ext>
+            </a:extLst>
+          </p:cNvPr>
+          <p:cNvCxnSpPr>
+            <a:stCxn id="113" idx="0"/>
+            <a:endCxn id="118" idx="2"/>
+          </p:cNvCxnSpPr>
+          <p:nvPr/>
+        </p:nvCxnSpPr>
+        <p:spPr>
+          <a:xfrm flipV="1">
+            <a:off x="5347185" y="2711583"/>
+            <a:ext cx="0" cy="364542"/>
+          </a:xfrm>
+          <a:prstGeom prst="straightConnector1">
+            <a:avLst/>
+          </a:prstGeom>
+          <a:ln w="25400">
+            <a:solidFill>
+              <a:schemeClr val="tx1"/>
+            </a:solidFill>
+            <a:prstDash val="dash"/>
+            <a:headEnd type="stealth"/>
+            <a:tailEnd type="none"/>
+          </a:ln>
+        </p:spPr>
+        <p:style>
+          <a:lnRef idx="1">
+            <a:schemeClr val="accent1"/>
+          </a:lnRef>
+          <a:fillRef idx="0">
+            <a:schemeClr val="accent1"/>
+          </a:fillRef>
+          <a:effectRef idx="0">
+            <a:schemeClr val="accent1"/>
+          </a:effectRef>
+          <a:fontRef idx="minor">
+            <a:schemeClr val="tx1"/>
+          </a:fontRef>
+        </p:style>
+      </p:cxnSp>
+      <p:sp>
+        <p:nvSpPr>
+          <p:cNvPr id="121" name="Rectangle 120">
+            <a:extLst>
+              <a:ext uri="{FF2B5EF4-FFF2-40B4-BE49-F238E27FC236}">
+                <a16:creationId xmlns:a16="http://schemas.microsoft.com/office/drawing/2014/main" id="{2FBFF4BD-6A07-4649-8A43-1A012825DC50}"/>
+              </a:ext>
+            </a:extLst>
+          </p:cNvPr>
+          <p:cNvSpPr/>
+          <p:nvPr/>
+        </p:nvSpPr>
+        <p:spPr>
+          <a:xfrm>
+            <a:off x="8196504" y="1800170"/>
+            <a:ext cx="914400" cy="914400"/>
+          </a:xfrm>
+          <a:prstGeom prst="rect">
+            <a:avLst/>
+          </a:prstGeom>
+          <a:noFill/>
+          <a:ln w="25400">
+            <a:solidFill>
+              <a:srgbClr val="0000FF"/>
+            </a:solidFill>
+          </a:ln>
+        </p:spPr>
+        <p:style>
+          <a:lnRef idx="2">
+            <a:schemeClr val="accent1">
+              <a:shade val="50000"/>
+            </a:schemeClr>
+          </a:lnRef>
+          <a:fillRef idx="1">
+            <a:schemeClr val="accent1"/>
+          </a:fillRef>
+          <a:effectRef idx="0">
+            <a:schemeClr val="accent1"/>
+          </a:effectRef>
+          <a:fontRef idx="minor">
+            <a:schemeClr val="lt1"/>
+          </a:fontRef>
+        </p:style>
+        <p:txBody>
+          <a:bodyPr rot="0" spcFirstLastPara="0" vertOverflow="overflow" horzOverflow="overflow" vert="horz" wrap="square" lIns="91440" tIns="45720" rIns="91440" bIns="45720" numCol="1" spcCol="0" rtlCol="0" fromWordArt="0" anchor="ctr" anchorCtr="0" forceAA="0" compatLnSpc="1">
+            <a:prstTxWarp prst="textNoShape">
+              <a:avLst/>
+            </a:prstTxWarp>
+            <a:noAutofit/>
+          </a:bodyPr>
+          <a:lstStyle/>
+          <a:p>
+            <a:pPr algn="ctr"/>
+            <a:r>
+              <a:rPr lang="en-US" sz="1200" dirty="0">
+                <a:solidFill>
+                  <a:schemeClr val="tx1"/>
+                </a:solidFill>
+              </a:rPr>
+              <a:t>Edit</a:t>
+            </a:r>
+          </a:p>
+          <a:p>
+            <a:pPr algn="ctr"/>
+            <a:r>
+              <a:rPr lang="en-US" sz="1200" dirty="0">
+                <a:solidFill>
+                  <a:schemeClr val="tx1"/>
+                </a:solidFill>
+              </a:rPr>
+              <a:t>&lt;Cut&gt;</a:t>
+            </a:r>
+          </a:p>
+          <a:p>
+            <a:pPr algn="ctr"/>
+            <a:r>
+              <a:rPr lang="en-US" sz="1200" dirty="0">
+                <a:solidFill>
+                  <a:schemeClr val="tx1"/>
+                </a:solidFill>
+              </a:rPr>
+              <a:t>&lt;Copy&gt;</a:t>
+            </a:r>
+          </a:p>
+          <a:p>
+            <a:pPr algn="ctr"/>
+            <a:r>
+              <a:rPr lang="en-US" sz="1200" dirty="0">
+                <a:solidFill>
+                  <a:schemeClr val="tx1"/>
+                </a:solidFill>
+              </a:rPr>
+              <a:t>&lt;Paste&gt;</a:t>
+            </a:r>
+          </a:p>
+        </p:txBody>
+      </p:sp>
+      <p:cxnSp>
+        <p:nvCxnSpPr>
+          <p:cNvPr id="123" name="Straight Arrow Connector 122">
+            <a:extLst>
+              <a:ext uri="{FF2B5EF4-FFF2-40B4-BE49-F238E27FC236}">
+                <a16:creationId xmlns:a16="http://schemas.microsoft.com/office/drawing/2014/main" id="{18F985F2-3E48-448C-B78E-77B91A002358}"/>
+              </a:ext>
+            </a:extLst>
+          </p:cNvPr>
+          <p:cNvCxnSpPr>
+            <a:stCxn id="121" idx="2"/>
+            <a:endCxn id="112" idx="0"/>
+          </p:cNvCxnSpPr>
+          <p:nvPr/>
+        </p:nvCxnSpPr>
+        <p:spPr>
+          <a:xfrm>
+            <a:off x="8653704" y="2714570"/>
+            <a:ext cx="0" cy="369333"/>
+          </a:xfrm>
+          <a:prstGeom prst="straightConnector1">
+            <a:avLst/>
+          </a:prstGeom>
+          <a:ln w="25400">
+            <a:solidFill>
+              <a:schemeClr val="tx1"/>
+            </a:solidFill>
+            <a:prstDash val="dash"/>
+            <a:headEnd type="stealth"/>
+            <a:tailEnd type="none"/>
+          </a:ln>
+        </p:spPr>
+        <p:style>
+          <a:lnRef idx="1">
+            <a:schemeClr val="accent1"/>
+          </a:lnRef>
+          <a:fillRef idx="0">
+            <a:schemeClr val="accent1"/>
+          </a:fillRef>
+          <a:effectRef idx="0">
+            <a:schemeClr val="accent1"/>
+          </a:effectRef>
+          <a:fontRef idx="minor">
+            <a:schemeClr val="tx1"/>
+          </a:fontRef>
+        </p:style>
+      </p:cxnSp>
+      <p:sp>
+        <p:nvSpPr>
+          <p:cNvPr id="125" name="Rectangle 124">
+            <a:extLst>
+              <a:ext uri="{FF2B5EF4-FFF2-40B4-BE49-F238E27FC236}">
+                <a16:creationId xmlns:a16="http://schemas.microsoft.com/office/drawing/2014/main" id="{BE93F6BA-EDFF-4623-925C-83D2323FBFE1}"/>
+              </a:ext>
+            </a:extLst>
+          </p:cNvPr>
+          <p:cNvSpPr/>
+          <p:nvPr/>
+        </p:nvSpPr>
+        <p:spPr>
+          <a:xfrm>
+            <a:off x="6463116" y="3083903"/>
+            <a:ext cx="994528" cy="914400"/>
+          </a:xfrm>
+          <a:prstGeom prst="rect">
+            <a:avLst/>
+          </a:prstGeom>
+          <a:noFill/>
+          <a:ln w="25400">
+            <a:solidFill>
+              <a:srgbClr val="0000FF"/>
+            </a:solidFill>
+          </a:ln>
+        </p:spPr>
+        <p:style>
+          <a:lnRef idx="2">
+            <a:schemeClr val="accent1">
+              <a:shade val="50000"/>
+            </a:schemeClr>
+          </a:lnRef>
+          <a:fillRef idx="1">
+            <a:schemeClr val="accent1"/>
+          </a:fillRef>
+          <a:effectRef idx="0">
+            <a:schemeClr val="accent1"/>
+          </a:effectRef>
+          <a:fontRef idx="minor">
+            <a:schemeClr val="lt1"/>
+          </a:fontRef>
+        </p:style>
+        <p:txBody>
+          <a:bodyPr rot="0" spcFirstLastPara="0" vertOverflow="overflow" horzOverflow="overflow" vert="horz" wrap="square" lIns="91440" tIns="45720" rIns="91440" bIns="45720" numCol="1" spcCol="0" rtlCol="0" fromWordArt="0" anchor="ctr" anchorCtr="0" forceAA="0" compatLnSpc="1">
+            <a:prstTxWarp prst="textNoShape">
+              <a:avLst/>
+            </a:prstTxWarp>
+            <a:noAutofit/>
+          </a:bodyPr>
+          <a:lstStyle/>
+          <a:p>
+            <a:pPr algn="ctr"/>
+            <a:r>
+              <a:rPr lang="en-US" sz="1200" dirty="0">
+                <a:solidFill>
+                  <a:schemeClr val="tx1"/>
+                </a:solidFill>
+              </a:rPr>
+              <a:t>Table of Contents</a:t>
+            </a:r>
+          </a:p>
+          <a:p>
+            <a:pPr algn="ctr"/>
+            <a:r>
+              <a:rPr lang="en-US" sz="1200" dirty="0">
+                <a:solidFill>
+                  <a:schemeClr val="tx1"/>
+                </a:solidFill>
+              </a:rPr>
+              <a:t>&lt;Elements&gt;</a:t>
+            </a:r>
+          </a:p>
+        </p:txBody>
+      </p:sp>
+      <p:cxnSp>
+        <p:nvCxnSpPr>
+          <p:cNvPr id="131" name="Straight Arrow Connector 130">
+            <a:extLst>
+              <a:ext uri="{FF2B5EF4-FFF2-40B4-BE49-F238E27FC236}">
+                <a16:creationId xmlns:a16="http://schemas.microsoft.com/office/drawing/2014/main" id="{647EB174-0FD4-485D-B4CB-288928AAB2B2}"/>
+              </a:ext>
+            </a:extLst>
+          </p:cNvPr>
+          <p:cNvCxnSpPr>
+            <a:stCxn id="125" idx="3"/>
+            <a:endCxn id="112" idx="1"/>
+          </p:cNvCxnSpPr>
+          <p:nvPr/>
+        </p:nvCxnSpPr>
+        <p:spPr>
+          <a:xfrm>
+            <a:off x="7457644" y="3541103"/>
+            <a:ext cx="658732" cy="0"/>
+          </a:xfrm>
+          <a:prstGeom prst="straightConnector1">
+            <a:avLst/>
+          </a:prstGeom>
+          <a:ln w="25400">
+            <a:solidFill>
+              <a:schemeClr val="tx1"/>
+            </a:solidFill>
+            <a:headEnd type="triangle"/>
+            <a:tailEnd type="triangle"/>
+          </a:ln>
+        </p:spPr>
+        <p:style>
+          <a:lnRef idx="1">
+            <a:schemeClr val="accent1"/>
+          </a:lnRef>
+          <a:fillRef idx="0">
+            <a:schemeClr val="accent1"/>
+          </a:fillRef>
+          <a:effectRef idx="0">
+            <a:schemeClr val="accent1"/>
+          </a:effectRef>
+          <a:fontRef idx="minor">
+            <a:schemeClr val="tx1"/>
+          </a:fontRef>
+        </p:style>
+      </p:cxnSp>
+      <p:cxnSp>
+        <p:nvCxnSpPr>
+          <p:cNvPr id="135" name="Straight Arrow Connector 134">
+            <a:extLst>
+              <a:ext uri="{FF2B5EF4-FFF2-40B4-BE49-F238E27FC236}">
+                <a16:creationId xmlns:a16="http://schemas.microsoft.com/office/drawing/2014/main" id="{9B552043-06FE-4F4A-8E94-F7006857CF0F}"/>
+              </a:ext>
+            </a:extLst>
+          </p:cNvPr>
+          <p:cNvCxnSpPr>
+            <a:cxnSpLocks/>
+            <a:stCxn id="112" idx="2"/>
+            <a:endCxn id="141" idx="3"/>
+          </p:cNvCxnSpPr>
+          <p:nvPr/>
+        </p:nvCxnSpPr>
+        <p:spPr>
+          <a:xfrm flipH="1">
+            <a:off x="7608950" y="3998303"/>
+            <a:ext cx="1044754" cy="1102702"/>
+          </a:xfrm>
+          <a:prstGeom prst="straightConnector1">
+            <a:avLst/>
+          </a:prstGeom>
+          <a:ln w="25400">
+            <a:solidFill>
+              <a:schemeClr val="tx1"/>
+            </a:solidFill>
+            <a:prstDash val="dash"/>
+            <a:headEnd type="none"/>
+            <a:tailEnd type="none"/>
+          </a:ln>
+        </p:spPr>
+        <p:style>
+          <a:lnRef idx="1">
+            <a:schemeClr val="accent1"/>
+          </a:lnRef>
+          <a:fillRef idx="0">
+            <a:schemeClr val="accent1"/>
+          </a:fillRef>
+          <a:effectRef idx="0">
+            <a:schemeClr val="accent1"/>
+          </a:effectRef>
+          <a:fontRef idx="minor">
+            <a:schemeClr val="tx1"/>
+          </a:fontRef>
+        </p:style>
+      </p:cxnSp>
+      <p:sp>
+        <p:nvSpPr>
+          <p:cNvPr id="136" name="Rectangle 135">
+            <a:extLst>
+              <a:ext uri="{FF2B5EF4-FFF2-40B4-BE49-F238E27FC236}">
+                <a16:creationId xmlns:a16="http://schemas.microsoft.com/office/drawing/2014/main" id="{F9547884-C0EE-4A24-A2AB-461924BBF01A}"/>
+              </a:ext>
+            </a:extLst>
+          </p:cNvPr>
+          <p:cNvSpPr/>
+          <p:nvPr/>
+        </p:nvSpPr>
+        <p:spPr>
+          <a:xfrm>
+            <a:off x="6503180" y="1815959"/>
+            <a:ext cx="914400" cy="914400"/>
+          </a:xfrm>
+          <a:prstGeom prst="rect">
+            <a:avLst/>
+          </a:prstGeom>
+          <a:noFill/>
+          <a:ln w="25400">
+            <a:solidFill>
+              <a:srgbClr val="0000FF"/>
+            </a:solidFill>
+          </a:ln>
+        </p:spPr>
+        <p:style>
+          <a:lnRef idx="2">
+            <a:schemeClr val="accent1">
+              <a:shade val="50000"/>
+            </a:schemeClr>
+          </a:lnRef>
+          <a:fillRef idx="1">
+            <a:schemeClr val="accent1"/>
+          </a:fillRef>
+          <a:effectRef idx="0">
+            <a:schemeClr val="accent1"/>
+          </a:effectRef>
+          <a:fontRef idx="minor">
+            <a:schemeClr val="lt1"/>
+          </a:fontRef>
+        </p:style>
+        <p:txBody>
+          <a:bodyPr rot="0" spcFirstLastPara="0" vertOverflow="overflow" horzOverflow="overflow" vert="horz" wrap="square" lIns="91440" tIns="45720" rIns="91440" bIns="45720" numCol="1" spcCol="0" rtlCol="0" fromWordArt="0" anchor="ctr" anchorCtr="0" forceAA="0" compatLnSpc="1">
+            <a:prstTxWarp prst="textNoShape">
+              <a:avLst/>
+            </a:prstTxWarp>
+            <a:noAutofit/>
+          </a:bodyPr>
+          <a:lstStyle/>
+          <a:p>
+            <a:pPr algn="ctr"/>
+            <a:r>
+              <a:rPr lang="en-US" sz="1200" dirty="0">
+                <a:solidFill>
+                  <a:schemeClr val="tx1"/>
+                </a:solidFill>
+              </a:rPr>
+              <a:t>Previous</a:t>
+            </a:r>
+          </a:p>
+          <a:p>
+            <a:pPr algn="ctr"/>
+            <a:r>
+              <a:rPr lang="en-US" sz="1200" dirty="0">
+                <a:solidFill>
+                  <a:schemeClr val="tx1"/>
+                </a:solidFill>
+              </a:rPr>
+              <a:t>Next</a:t>
+            </a:r>
+          </a:p>
+        </p:txBody>
+      </p:sp>
+      <p:cxnSp>
+        <p:nvCxnSpPr>
+          <p:cNvPr id="140" name="Straight Arrow Connector 139">
+            <a:extLst>
+              <a:ext uri="{FF2B5EF4-FFF2-40B4-BE49-F238E27FC236}">
+                <a16:creationId xmlns:a16="http://schemas.microsoft.com/office/drawing/2014/main" id="{B3BA38A2-319F-40B9-AEFD-D4DBBD93B0CD}"/>
+              </a:ext>
+            </a:extLst>
+          </p:cNvPr>
+          <p:cNvCxnSpPr>
+            <a:cxnSpLocks/>
+            <a:stCxn id="136" idx="2"/>
+            <a:endCxn id="125" idx="0"/>
+          </p:cNvCxnSpPr>
+          <p:nvPr/>
+        </p:nvCxnSpPr>
+        <p:spPr>
+          <a:xfrm>
+            <a:off x="6960380" y="2730359"/>
+            <a:ext cx="0" cy="353544"/>
+          </a:xfrm>
+          <a:prstGeom prst="straightConnector1">
+            <a:avLst/>
+          </a:prstGeom>
+          <a:ln w="25400">
+            <a:solidFill>
+              <a:schemeClr val="tx1"/>
+            </a:solidFill>
+            <a:tailEnd type="triangle"/>
+          </a:ln>
+        </p:spPr>
+        <p:style>
+          <a:lnRef idx="1">
+            <a:schemeClr val="accent1"/>
+          </a:lnRef>
+          <a:fillRef idx="0">
+            <a:schemeClr val="accent1"/>
+          </a:fillRef>
+          <a:effectRef idx="0">
+            <a:schemeClr val="accent1"/>
+          </a:effectRef>
+          <a:fontRef idx="minor">
+            <a:schemeClr val="tx1"/>
+          </a:fontRef>
+        </p:style>
+      </p:cxnSp>
+      <p:sp>
+        <p:nvSpPr>
+          <p:cNvPr id="141" name="Rectangle 140">
+            <a:extLst>
+              <a:ext uri="{FF2B5EF4-FFF2-40B4-BE49-F238E27FC236}">
+                <a16:creationId xmlns:a16="http://schemas.microsoft.com/office/drawing/2014/main" id="{CD25881E-4435-4B53-B464-8463E55C5EC5}"/>
+              </a:ext>
+            </a:extLst>
+          </p:cNvPr>
+          <p:cNvSpPr/>
+          <p:nvPr/>
+        </p:nvSpPr>
+        <p:spPr>
+          <a:xfrm>
+            <a:off x="6311809" y="4496569"/>
+            <a:ext cx="1297141" cy="1208871"/>
+          </a:xfrm>
+          <a:prstGeom prst="rect">
+            <a:avLst/>
+          </a:prstGeom>
+          <a:noFill/>
+          <a:ln w="25400">
+            <a:solidFill>
+              <a:srgbClr val="0000FF"/>
+            </a:solidFill>
+          </a:ln>
+        </p:spPr>
+        <p:style>
+          <a:lnRef idx="2">
+            <a:schemeClr val="accent1">
+              <a:shade val="50000"/>
+            </a:schemeClr>
+          </a:lnRef>
+          <a:fillRef idx="1">
+            <a:schemeClr val="accent1"/>
+          </a:fillRef>
+          <a:effectRef idx="0">
+            <a:schemeClr val="accent1"/>
+          </a:effectRef>
+          <a:fontRef idx="minor">
+            <a:schemeClr val="lt1"/>
+          </a:fontRef>
+        </p:style>
+        <p:txBody>
+          <a:bodyPr rot="0" spcFirstLastPara="0" vertOverflow="overflow" horzOverflow="overflow" vert="horz" wrap="square" lIns="91440" tIns="45720" rIns="91440" bIns="45720" numCol="1" spcCol="0" rtlCol="0" fromWordArt="0" anchor="ctr" anchorCtr="0" forceAA="0" compatLnSpc="1">
+            <a:prstTxWarp prst="textNoShape">
+              <a:avLst/>
+            </a:prstTxWarp>
+            <a:noAutofit/>
+          </a:bodyPr>
+          <a:lstStyle/>
+          <a:p>
+            <a:pPr algn="ctr"/>
+            <a:r>
+              <a:rPr lang="en-US" sz="1200" dirty="0">
+                <a:solidFill>
+                  <a:schemeClr val="tx1"/>
+                </a:solidFill>
+              </a:rPr>
+              <a:t>Node</a:t>
+            </a:r>
+          </a:p>
+          <a:p>
+            <a:pPr algn="ctr"/>
+            <a:r>
+              <a:rPr lang="en-US" sz="1200" dirty="0">
+                <a:solidFill>
+                  <a:schemeClr val="tx1"/>
+                </a:solidFill>
+              </a:rPr>
+              <a:t>&lt;</a:t>
+            </a:r>
+            <a:r>
+              <a:rPr lang="en-US" sz="1200" dirty="0" err="1">
+                <a:solidFill>
+                  <a:schemeClr val="tx1"/>
+                </a:solidFill>
+              </a:rPr>
+              <a:t>ElementTag</a:t>
+            </a:r>
+            <a:r>
+              <a:rPr lang="en-US" sz="1200" dirty="0">
+                <a:solidFill>
+                  <a:schemeClr val="tx1"/>
+                </a:solidFill>
+              </a:rPr>
+              <a:t>&gt;</a:t>
+            </a:r>
+          </a:p>
+          <a:p>
+            <a:pPr algn="ctr"/>
+            <a:r>
+              <a:rPr lang="en-US" sz="1200" dirty="0">
+                <a:solidFill>
+                  <a:schemeClr val="tx1"/>
+                </a:solidFill>
+              </a:rPr>
+              <a:t>&lt;</a:t>
+            </a:r>
+            <a:r>
+              <a:rPr lang="en-US" sz="1200" dirty="0" err="1">
+                <a:solidFill>
+                  <a:schemeClr val="tx1"/>
+                </a:solidFill>
+              </a:rPr>
+              <a:t>ElementName</a:t>
+            </a:r>
+            <a:r>
+              <a:rPr lang="en-US" sz="1200" dirty="0">
+                <a:solidFill>
+                  <a:schemeClr val="tx1"/>
+                </a:solidFill>
+              </a:rPr>
+              <a:t>&gt;</a:t>
+            </a:r>
+          </a:p>
+          <a:p>
+            <a:pPr algn="ctr"/>
+            <a:r>
+              <a:rPr lang="en-US" sz="1200" dirty="0">
+                <a:solidFill>
+                  <a:schemeClr val="tx1"/>
+                </a:solidFill>
+              </a:rPr>
+              <a:t>&lt;Question&gt;</a:t>
+            </a:r>
+          </a:p>
+          <a:p>
+            <a:pPr algn="ctr"/>
+            <a:r>
+              <a:rPr lang="en-US" sz="1200" dirty="0">
+                <a:solidFill>
+                  <a:schemeClr val="tx1"/>
+                </a:solidFill>
+              </a:rPr>
+              <a:t>&lt;Answer&gt;</a:t>
+            </a:r>
+          </a:p>
+          <a:p>
+            <a:pPr algn="ctr"/>
+            <a:r>
+              <a:rPr lang="en-US" sz="1200" dirty="0">
+                <a:solidFill>
+                  <a:schemeClr val="tx1"/>
+                </a:solidFill>
+              </a:rPr>
+              <a:t>&lt;Verified&gt;</a:t>
+            </a:r>
+          </a:p>
+        </p:txBody>
+      </p:sp>
+      <p:cxnSp>
+        <p:nvCxnSpPr>
+          <p:cNvPr id="150" name="Straight Arrow Connector 149">
+            <a:extLst>
+              <a:ext uri="{FF2B5EF4-FFF2-40B4-BE49-F238E27FC236}">
+                <a16:creationId xmlns:a16="http://schemas.microsoft.com/office/drawing/2014/main" id="{D66D7B73-28AA-4257-B030-5E2E904DD005}"/>
+              </a:ext>
+            </a:extLst>
+          </p:cNvPr>
+          <p:cNvCxnSpPr>
+            <a:cxnSpLocks/>
+            <a:stCxn id="141" idx="1"/>
+            <a:endCxn id="155" idx="3"/>
+          </p:cNvCxnSpPr>
+          <p:nvPr/>
+        </p:nvCxnSpPr>
+        <p:spPr>
+          <a:xfrm flipH="1" flipV="1">
+            <a:off x="5597938" y="4278164"/>
+            <a:ext cx="713871" cy="822841"/>
+          </a:xfrm>
+          <a:prstGeom prst="straightConnector1">
+            <a:avLst/>
+          </a:prstGeom>
+          <a:ln w="25400">
+            <a:solidFill>
+              <a:schemeClr val="tx1"/>
+            </a:solidFill>
+            <a:headEnd type="none"/>
+            <a:tailEnd type="none"/>
+          </a:ln>
+        </p:spPr>
+        <p:style>
+          <a:lnRef idx="1">
+            <a:schemeClr val="accent1"/>
+          </a:lnRef>
+          <a:fillRef idx="0">
+            <a:schemeClr val="accent1"/>
+          </a:fillRef>
+          <a:effectRef idx="0">
+            <a:schemeClr val="accent1"/>
+          </a:effectRef>
+          <a:fontRef idx="minor">
+            <a:schemeClr val="tx1"/>
+          </a:fontRef>
+        </p:style>
+      </p:cxnSp>
+      <p:sp>
+        <p:nvSpPr>
+          <p:cNvPr id="155" name="Flowchart: Decision 154">
+            <a:extLst>
+              <a:ext uri="{FF2B5EF4-FFF2-40B4-BE49-F238E27FC236}">
+                <a16:creationId xmlns:a16="http://schemas.microsoft.com/office/drawing/2014/main" id="{9BFB5D11-6CEF-4916-909E-F2C95613113D}"/>
+              </a:ext>
+            </a:extLst>
+          </p:cNvPr>
+          <p:cNvSpPr/>
+          <p:nvPr/>
+        </p:nvSpPr>
+        <p:spPr>
+          <a:xfrm rot="2825388">
+            <a:off x="5302177" y="4038523"/>
+            <a:ext cx="351918" cy="221530"/>
+          </a:xfrm>
+          <a:prstGeom prst="flowChartDecision">
+            <a:avLst/>
+          </a:prstGeom>
+          <a:solidFill>
+            <a:schemeClr val="tx1"/>
+          </a:solidFill>
+          <a:ln w="25400">
+            <a:solidFill>
+              <a:schemeClr val="tx1"/>
+            </a:solidFill>
+          </a:ln>
+        </p:spPr>
+        <p:style>
+          <a:lnRef idx="2">
+            <a:schemeClr val="accent1">
+              <a:shade val="50000"/>
+            </a:schemeClr>
+          </a:lnRef>
+          <a:fillRef idx="1">
+            <a:schemeClr val="accent1"/>
+          </a:fillRef>
+          <a:effectRef idx="0">
+            <a:schemeClr val="accent1"/>
+          </a:effectRef>
+          <a:fontRef idx="minor">
+            <a:schemeClr val="lt1"/>
+          </a:fontRef>
+        </p:style>
+        <p:txBody>
+          <a:bodyPr rot="0" spcFirstLastPara="0" vertOverflow="overflow" horzOverflow="overflow" vert="horz" wrap="square" lIns="91440" tIns="45720" rIns="91440" bIns="45720" numCol="1" spcCol="0" rtlCol="0" fromWordArt="0" anchor="ctr" anchorCtr="0" forceAA="0" compatLnSpc="1">
+            <a:prstTxWarp prst="textNoShape">
+              <a:avLst/>
+            </a:prstTxWarp>
+            <a:noAutofit/>
+          </a:bodyPr>
+          <a:lstStyle/>
+          <a:p>
+            <a:pPr algn="ctr"/>
+            <a:endParaRPr lang="en-US" sz="1200">
+              <a:solidFill>
+                <a:schemeClr val="tx1"/>
+              </a:solidFill>
+            </a:endParaRPr>
+          </a:p>
+        </p:txBody>
+      </p:sp>
+      <p:sp>
+        <p:nvSpPr>
+          <p:cNvPr id="158" name="TextBox 157">
+            <a:extLst>
+              <a:ext uri="{FF2B5EF4-FFF2-40B4-BE49-F238E27FC236}">
+                <a16:creationId xmlns:a16="http://schemas.microsoft.com/office/drawing/2014/main" id="{8775BBE3-AED7-4067-AA17-4A0DDC419A33}"/>
+              </a:ext>
+            </a:extLst>
+          </p:cNvPr>
+          <p:cNvSpPr txBox="1"/>
+          <p:nvPr/>
+        </p:nvSpPr>
+        <p:spPr>
+          <a:xfrm>
+            <a:off x="5525684" y="3908832"/>
+            <a:ext cx="288862" cy="369332"/>
+          </a:xfrm>
+          <a:prstGeom prst="rect">
+            <a:avLst/>
+          </a:prstGeom>
+          <a:noFill/>
+        </p:spPr>
+        <p:txBody>
+          <a:bodyPr wrap="none" rtlCol="0">
+            <a:spAutoFit/>
+          </a:bodyPr>
           <a:lstStyle/>
           <a:p>
             <a:r>
               <a:rPr lang="en-US" dirty="0"/>
-              <a:t>Image: architecture diagram</a:t>
-            </a:r>
-          </a:p>
+              <a:t>1</a:t>
+            </a:r>
+          </a:p>
+        </p:txBody>
+      </p:sp>
+      <p:sp>
+        <p:nvSpPr>
+          <p:cNvPr id="159" name="TextBox 158">
+            <a:extLst>
+              <a:ext uri="{FF2B5EF4-FFF2-40B4-BE49-F238E27FC236}">
+                <a16:creationId xmlns:a16="http://schemas.microsoft.com/office/drawing/2014/main" id="{0EE1A084-0C5B-4B9C-A7D4-D13CBD6C1A80}"/>
+              </a:ext>
+            </a:extLst>
+          </p:cNvPr>
+          <p:cNvSpPr txBox="1"/>
+          <p:nvPr/>
+        </p:nvSpPr>
+        <p:spPr>
+          <a:xfrm>
+            <a:off x="5799563" y="3185036"/>
+            <a:ext cx="288862" cy="369332"/>
+          </a:xfrm>
+          <a:prstGeom prst="rect">
+            <a:avLst/>
+          </a:prstGeom>
+          <a:noFill/>
+        </p:spPr>
+        <p:txBody>
+          <a:bodyPr wrap="none" rtlCol="0">
+            <a:spAutoFit/>
+          </a:bodyPr>
+          <a:lstStyle/>
           <a:p>
             <a:r>
               <a:rPr lang="en-US" dirty="0"/>
-              <a:t>Give a short overview description to the audience</a:t>
+              <a:t>1</a:t>
+            </a:r>
+          </a:p>
+        </p:txBody>
+      </p:sp>
+      <p:sp>
+        <p:nvSpPr>
+          <p:cNvPr id="160" name="TextBox 159">
+            <a:extLst>
+              <a:ext uri="{FF2B5EF4-FFF2-40B4-BE49-F238E27FC236}">
+                <a16:creationId xmlns:a16="http://schemas.microsoft.com/office/drawing/2014/main" id="{C47B9F0E-4811-40C4-9D22-2DE0A853DE97}"/>
+              </a:ext>
+            </a:extLst>
+          </p:cNvPr>
+          <p:cNvSpPr txBox="1"/>
+          <p:nvPr/>
+        </p:nvSpPr>
+        <p:spPr>
+          <a:xfrm>
+            <a:off x="6236159" y="3185036"/>
+            <a:ext cx="288862" cy="369332"/>
+          </a:xfrm>
+          <a:prstGeom prst="rect">
+            <a:avLst/>
+          </a:prstGeom>
+          <a:noFill/>
+        </p:spPr>
+        <p:txBody>
+          <a:bodyPr wrap="none" rtlCol="0">
+            <a:spAutoFit/>
+          </a:bodyPr>
+          <a:lstStyle/>
+          <a:p>
+            <a:r>
+              <a:rPr lang="en-US" dirty="0"/>
+              <a:t>1</a:t>
+            </a:r>
+          </a:p>
+        </p:txBody>
+      </p:sp>
+      <p:sp>
+        <p:nvSpPr>
+          <p:cNvPr id="161" name="TextBox 160">
+            <a:extLst>
+              <a:ext uri="{FF2B5EF4-FFF2-40B4-BE49-F238E27FC236}">
+                <a16:creationId xmlns:a16="http://schemas.microsoft.com/office/drawing/2014/main" id="{62827A6F-5AFF-4DB6-B81B-CF8DA70CE719}"/>
+              </a:ext>
+            </a:extLst>
+          </p:cNvPr>
+          <p:cNvSpPr txBox="1"/>
+          <p:nvPr/>
+        </p:nvSpPr>
+        <p:spPr>
+          <a:xfrm>
+            <a:off x="6068107" y="4624107"/>
+            <a:ext cx="308098" cy="369332"/>
+          </a:xfrm>
+          <a:prstGeom prst="rect">
+            <a:avLst/>
+          </a:prstGeom>
+          <a:noFill/>
+        </p:spPr>
+        <p:txBody>
+          <a:bodyPr wrap="none" rtlCol="0">
+            <a:spAutoFit/>
+          </a:bodyPr>
+          <a:lstStyle/>
+          <a:p>
+            <a:r>
+              <a:rPr lang="en-US" dirty="0"/>
+              <a:t>*</a:t>
+            </a:r>
+          </a:p>
+        </p:txBody>
+      </p:sp>
+      <p:sp>
+        <p:nvSpPr>
+          <p:cNvPr id="162" name="TextBox 161">
+            <a:extLst>
+              <a:ext uri="{FF2B5EF4-FFF2-40B4-BE49-F238E27FC236}">
+                <a16:creationId xmlns:a16="http://schemas.microsoft.com/office/drawing/2014/main" id="{09356F1C-E711-4492-8BA7-941604CFF91D}"/>
+              </a:ext>
+            </a:extLst>
+          </p:cNvPr>
+          <p:cNvSpPr txBox="1"/>
+          <p:nvPr/>
+        </p:nvSpPr>
+        <p:spPr>
+          <a:xfrm>
+            <a:off x="7850541" y="3205383"/>
+            <a:ext cx="288862" cy="369332"/>
+          </a:xfrm>
+          <a:prstGeom prst="rect">
+            <a:avLst/>
+          </a:prstGeom>
+          <a:noFill/>
+        </p:spPr>
+        <p:txBody>
+          <a:bodyPr wrap="none" rtlCol="0">
+            <a:spAutoFit/>
+          </a:bodyPr>
+          <a:lstStyle/>
+          <a:p>
+            <a:r>
+              <a:rPr lang="en-US" dirty="0"/>
+              <a:t>1</a:t>
+            </a:r>
+          </a:p>
+        </p:txBody>
+      </p:sp>
+      <p:sp>
+        <p:nvSpPr>
+          <p:cNvPr id="163" name="TextBox 162">
+            <a:extLst>
+              <a:ext uri="{FF2B5EF4-FFF2-40B4-BE49-F238E27FC236}">
+                <a16:creationId xmlns:a16="http://schemas.microsoft.com/office/drawing/2014/main" id="{C385B769-B1FB-4D1C-BDEE-288069A23354}"/>
+              </a:ext>
+            </a:extLst>
+          </p:cNvPr>
+          <p:cNvSpPr txBox="1"/>
+          <p:nvPr/>
+        </p:nvSpPr>
+        <p:spPr>
+          <a:xfrm>
+            <a:off x="7454901" y="3244335"/>
+            <a:ext cx="308098" cy="369332"/>
+          </a:xfrm>
+          <a:prstGeom prst="rect">
+            <a:avLst/>
+          </a:prstGeom>
+          <a:noFill/>
+        </p:spPr>
+        <p:txBody>
+          <a:bodyPr wrap="none" rtlCol="0">
+            <a:spAutoFit/>
+          </a:bodyPr>
+          <a:lstStyle/>
+          <a:p>
+            <a:r>
+              <a:rPr lang="en-US" dirty="0"/>
+              <a:t>*</a:t>
+            </a:r>
+          </a:p>
+        </p:txBody>
+      </p:sp>
+      <p:sp>
+        <p:nvSpPr>
+          <p:cNvPr id="164" name="TextBox 163">
+            <a:extLst>
+              <a:ext uri="{FF2B5EF4-FFF2-40B4-BE49-F238E27FC236}">
+                <a16:creationId xmlns:a16="http://schemas.microsoft.com/office/drawing/2014/main" id="{A7250B16-6C87-471A-BC8B-F5E6DA306D07}"/>
+              </a:ext>
+            </a:extLst>
+          </p:cNvPr>
+          <p:cNvSpPr txBox="1"/>
+          <p:nvPr/>
+        </p:nvSpPr>
+        <p:spPr>
+          <a:xfrm>
+            <a:off x="3844090" y="3205383"/>
+            <a:ext cx="288862" cy="369332"/>
+          </a:xfrm>
+          <a:prstGeom prst="rect">
+            <a:avLst/>
+          </a:prstGeom>
+          <a:noFill/>
+        </p:spPr>
+        <p:txBody>
+          <a:bodyPr wrap="none" rtlCol="0">
+            <a:spAutoFit/>
+          </a:bodyPr>
+          <a:lstStyle/>
+          <a:p>
+            <a:r>
+              <a:rPr lang="en-US" dirty="0"/>
+              <a:t>1</a:t>
+            </a:r>
+          </a:p>
+        </p:txBody>
+      </p:sp>
+      <p:sp>
+        <p:nvSpPr>
+          <p:cNvPr id="165" name="TextBox 164">
+            <a:extLst>
+              <a:ext uri="{FF2B5EF4-FFF2-40B4-BE49-F238E27FC236}">
+                <a16:creationId xmlns:a16="http://schemas.microsoft.com/office/drawing/2014/main" id="{7F775C71-9A66-47ED-AD17-6F8F4CE23F81}"/>
+              </a:ext>
+            </a:extLst>
+          </p:cNvPr>
+          <p:cNvSpPr txBox="1"/>
+          <p:nvPr/>
+        </p:nvSpPr>
+        <p:spPr>
+          <a:xfrm>
+            <a:off x="4632076" y="3205383"/>
+            <a:ext cx="288862" cy="369332"/>
+          </a:xfrm>
+          <a:prstGeom prst="rect">
+            <a:avLst/>
+          </a:prstGeom>
+          <a:noFill/>
+        </p:spPr>
+        <p:txBody>
+          <a:bodyPr wrap="none" rtlCol="0">
+            <a:spAutoFit/>
+          </a:bodyPr>
+          <a:lstStyle/>
+          <a:p>
+            <a:r>
+              <a:rPr lang="en-US" dirty="0"/>
+              <a:t>1</a:t>
+            </a:r>
+          </a:p>
+        </p:txBody>
+      </p:sp>
+      <p:sp>
+        <p:nvSpPr>
+          <p:cNvPr id="166" name="TextBox 165">
+            <a:extLst>
+              <a:ext uri="{FF2B5EF4-FFF2-40B4-BE49-F238E27FC236}">
+                <a16:creationId xmlns:a16="http://schemas.microsoft.com/office/drawing/2014/main" id="{BD0AF432-7B07-488A-BC22-B7969EA65230}"/>
+              </a:ext>
+            </a:extLst>
+          </p:cNvPr>
+          <p:cNvSpPr txBox="1"/>
+          <p:nvPr/>
+        </p:nvSpPr>
+        <p:spPr>
+          <a:xfrm>
+            <a:off x="8196504" y="3905173"/>
+            <a:ext cx="288862" cy="369332"/>
+          </a:xfrm>
+          <a:prstGeom prst="rect">
+            <a:avLst/>
+          </a:prstGeom>
+          <a:noFill/>
+        </p:spPr>
+        <p:txBody>
+          <a:bodyPr wrap="none" rtlCol="0">
+            <a:spAutoFit/>
+          </a:bodyPr>
+          <a:lstStyle/>
+          <a:p>
+            <a:r>
+              <a:rPr lang="en-US" dirty="0"/>
+              <a:t>1</a:t>
+            </a:r>
+          </a:p>
+        </p:txBody>
+      </p:sp>
+      <p:sp>
+        <p:nvSpPr>
+          <p:cNvPr id="167" name="TextBox 166">
+            <a:extLst>
+              <a:ext uri="{FF2B5EF4-FFF2-40B4-BE49-F238E27FC236}">
+                <a16:creationId xmlns:a16="http://schemas.microsoft.com/office/drawing/2014/main" id="{C3CE4B3D-5B87-425E-BCF2-F3D8D8937801}"/>
+              </a:ext>
+            </a:extLst>
+          </p:cNvPr>
+          <p:cNvSpPr txBox="1"/>
+          <p:nvPr/>
+        </p:nvSpPr>
+        <p:spPr>
+          <a:xfrm>
+            <a:off x="7585431" y="4626289"/>
+            <a:ext cx="308098" cy="369332"/>
+          </a:xfrm>
+          <a:prstGeom prst="rect">
+            <a:avLst/>
+          </a:prstGeom>
+          <a:noFill/>
+        </p:spPr>
+        <p:txBody>
+          <a:bodyPr wrap="none" rtlCol="0">
+            <a:spAutoFit/>
+          </a:bodyPr>
+          <a:lstStyle/>
+          <a:p>
+            <a:r>
+              <a:rPr lang="en-US" dirty="0"/>
+              <a:t>*</a:t>
             </a:r>
           </a:p>
         </p:txBody>
@@ -6753,12 +8678,86 @@
           </a:xfrm>
         </p:spPr>
         <p:txBody>
-          <a:bodyPr anchor="t"/>
+          <a:bodyPr anchor="t">
+            <a:normAutofit fontScale="92500" lnSpcReduction="10000"/>
+          </a:bodyPr>
           <a:lstStyle/>
           <a:p>
             <a:r>
               <a:rPr lang="en-US" dirty="0"/>
-              <a:t>Add information here: “restate chosen architectural style(s), then list issues, risks, questions, or anything that is uncertain and that class expertise/feedback might help you in.”</a:t>
+              <a:t>Repository Architectural Style</a:t>
+            </a:r>
+          </a:p>
+          <a:p>
+            <a:r>
+              <a:rPr lang="en-US" dirty="0"/>
+              <a:t>Issues:</a:t>
+            </a:r>
+          </a:p>
+          <a:p>
+            <a:pPr lvl="1"/>
+            <a:r>
+              <a:rPr lang="en-US" dirty="0"/>
+              <a:t>Control of Behavior and Flow</a:t>
+            </a:r>
+          </a:p>
+          <a:p>
+            <a:pPr lvl="1"/>
+            <a:r>
+              <a:rPr lang="en-US" dirty="0"/>
+              <a:t>Interaction of many GUI components. </a:t>
+            </a:r>
+          </a:p>
+          <a:p>
+            <a:pPr lvl="1"/>
+            <a:r>
+              <a:rPr lang="en-US" dirty="0"/>
+              <a:t>Designing the Node to capture requirements</a:t>
+            </a:r>
+          </a:p>
+          <a:p>
+            <a:pPr lvl="1"/>
+            <a:r>
+              <a:rPr lang="en-US" dirty="0"/>
+              <a:t>Duplication handling</a:t>
+            </a:r>
+          </a:p>
+          <a:p>
+            <a:pPr lvl="1"/>
+            <a:r>
+              <a:rPr lang="en-US" dirty="0"/>
+              <a:t>Testing</a:t>
+            </a:r>
+          </a:p>
+          <a:p>
+            <a:pPr lvl="1"/>
+            <a:r>
+              <a:rPr lang="en-US" dirty="0"/>
+              <a:t>Learning curve</a:t>
+            </a:r>
+          </a:p>
+          <a:p>
+            <a:r>
+              <a:rPr lang="en-US" dirty="0"/>
+              <a:t>Risks </a:t>
+            </a:r>
+          </a:p>
+          <a:p>
+            <a:pPr lvl="1"/>
+            <a:r>
+              <a:rPr lang="en-US" dirty="0"/>
+              <a:t>Time </a:t>
+            </a:r>
+            <a:r>
+              <a:rPr lang="en-US"/>
+              <a:t>/ Schedule</a:t>
+            </a:r>
+            <a:endParaRPr lang="en-US" dirty="0"/>
+          </a:p>
+          <a:p>
+            <a:r>
+              <a:rPr lang="en-US" dirty="0"/>
+              <a:t>Questions</a:t>
             </a:r>
           </a:p>
         </p:txBody>
@@ -7022,7 +9021,70 @@
       </a:bgFillStyleLst>
     </a:fmtScheme>
   </a:themeElements>
-  <a:objectDefaults/>
+  <a:objectDefaults>
+    <a:spDef>
+      <a:spPr>
+        <a:noFill/>
+        <a:ln w="25400">
+          <a:solidFill>
+            <a:srgbClr val="0000FF"/>
+          </a:solidFill>
+        </a:ln>
+      </a:spPr>
+      <a:bodyPr rtlCol="0" anchor="ctr"/>
+      <a:lstStyle>
+        <a:defPPr algn="ctr">
+          <a:defRPr sz="1200">
+            <a:solidFill>
+              <a:schemeClr val="tx1"/>
+            </a:solidFill>
+          </a:defRPr>
+        </a:defPPr>
+      </a:lstStyle>
+      <a:style>
+        <a:lnRef idx="2">
+          <a:schemeClr val="accent1">
+            <a:shade val="50000"/>
+          </a:schemeClr>
+        </a:lnRef>
+        <a:fillRef idx="1">
+          <a:schemeClr val="accent1"/>
+        </a:fillRef>
+        <a:effectRef idx="0">
+          <a:schemeClr val="accent1"/>
+        </a:effectRef>
+        <a:fontRef idx="minor">
+          <a:schemeClr val="lt1"/>
+        </a:fontRef>
+      </a:style>
+    </a:spDef>
+    <a:lnDef>
+      <a:spPr>
+        <a:ln w="25400">
+          <a:solidFill>
+            <a:schemeClr val="tx1"/>
+          </a:solidFill>
+          <a:tailEnd type="stealth"/>
+        </a:ln>
+      </a:spPr>
+      <a:bodyPr/>
+      <a:lstStyle/>
+      <a:style>
+        <a:lnRef idx="1">
+          <a:schemeClr val="accent1"/>
+        </a:lnRef>
+        <a:fillRef idx="0">
+          <a:schemeClr val="accent1"/>
+        </a:fillRef>
+        <a:effectRef idx="0">
+          <a:schemeClr val="accent1"/>
+        </a:effectRef>
+        <a:fontRef idx="minor">
+          <a:schemeClr val="tx1"/>
+        </a:fontRef>
+      </a:style>
+    </a:lnDef>
+  </a:objectDefaults>
   <a:extraClrSchemeLst/>
   <a:extLst>
     <a:ext uri="{05A4C25C-085E-4340-85A3-A5531E510DB2}">

</xml_diff>

<commit_message>
Presentation looks complete (v1.1)
The presentation appears to be complete for Thursday in class. Included final versions of the power point presentation and the pdf
</commit_message>
<xml_diff>
--- a/trunk/docs/TeamFE-ArchPresentation.pptx
+++ b/trunk/docs/TeamFE-ArchPresentation.pptx
@@ -115,10 +115,6 @@
     </p:ext>
   </p:extLst>
 </p:presentation>
-</file>
-
-<file path=ppt/revisionInfo.xml><?xml version="1.0" encoding="utf-8"?>
-<p1510:revInfo xmlns:a="http://schemas.openxmlformats.org/drawingml/2006/main" xmlns:r="http://schemas.openxmlformats.org/officeDocument/2006/relationships" xmlns:p1510="http://schemas.microsoft.com/office/powerpoint/2015/10/main"/>
 </file>
 
 <file path=ppt/changesInfos/changesInfo1.xml><?xml version="1.0" encoding="utf-8"?>
@@ -667,7 +663,7 @@
           <a:p>
             <a:fld id="{2D799662-88D0-4CED-9864-C2C5D3E3FDAB}" type="datetimeFigureOut">
               <a:rPr lang="en-US" smtClean="0"/>
-              <a:t>4/4/2018</a:t>
+              <a:t>2018-04-04</a:t>
             </a:fld>
             <a:endParaRPr lang="en-US"/>
           </a:p>
@@ -963,7 +959,7 @@
           <a:p>
             <a:fld id="{2D799662-88D0-4CED-9864-C2C5D3E3FDAB}" type="datetimeFigureOut">
               <a:rPr lang="en-US" smtClean="0"/>
-              <a:t>4/4/2018</a:t>
+              <a:t>2018-04-04</a:t>
             </a:fld>
             <a:endParaRPr lang="en-US"/>
           </a:p>
@@ -1211,7 +1207,7 @@
           <a:p>
             <a:fld id="{2D799662-88D0-4CED-9864-C2C5D3E3FDAB}" type="datetimeFigureOut">
               <a:rPr lang="en-US" smtClean="0"/>
-              <a:t>4/4/2018</a:t>
+              <a:t>2018-04-04</a:t>
             </a:fld>
             <a:endParaRPr lang="en-US"/>
           </a:p>
@@ -1751,7 +1747,7 @@
           <a:p>
             <a:fld id="{2D799662-88D0-4CED-9864-C2C5D3E3FDAB}" type="datetimeFigureOut">
               <a:rPr lang="en-US" smtClean="0"/>
-              <a:t>4/4/2018</a:t>
+              <a:t>2018-04-04</a:t>
             </a:fld>
             <a:endParaRPr lang="en-US"/>
           </a:p>
@@ -1999,7 +1995,7 @@
           <a:p>
             <a:fld id="{2D799662-88D0-4CED-9864-C2C5D3E3FDAB}" type="datetimeFigureOut">
               <a:rPr lang="en-US" smtClean="0"/>
-              <a:t>4/4/2018</a:t>
+              <a:t>2018-04-04</a:t>
             </a:fld>
             <a:endParaRPr lang="en-US"/>
           </a:p>
@@ -2531,7 +2527,7 @@
           <a:p>
             <a:fld id="{2D799662-88D0-4CED-9864-C2C5D3E3FDAB}" type="datetimeFigureOut">
               <a:rPr lang="en-US" smtClean="0"/>
-              <a:t>4/4/2018</a:t>
+              <a:t>2018-04-04</a:t>
             </a:fld>
             <a:endParaRPr lang="en-US"/>
           </a:p>
@@ -2828,7 +2824,7 @@
           <a:p>
             <a:fld id="{2D799662-88D0-4CED-9864-C2C5D3E3FDAB}" type="datetimeFigureOut">
               <a:rPr lang="en-US" smtClean="0"/>
-              <a:t>4/4/2018</a:t>
+              <a:t>2018-04-04</a:t>
             </a:fld>
             <a:endParaRPr lang="en-US"/>
           </a:p>
@@ -3002,7 +2998,7 @@
           <a:p>
             <a:fld id="{2D799662-88D0-4CED-9864-C2C5D3E3FDAB}" type="datetimeFigureOut">
               <a:rPr lang="en-US" smtClean="0"/>
-              <a:t>4/4/2018</a:t>
+              <a:t>2018-04-04</a:t>
             </a:fld>
             <a:endParaRPr lang="en-US"/>
           </a:p>
@@ -3182,7 +3178,7 @@
           <a:p>
             <a:fld id="{2D799662-88D0-4CED-9864-C2C5D3E3FDAB}" type="datetimeFigureOut">
               <a:rPr lang="en-US" smtClean="0"/>
-              <a:t>4/4/2018</a:t>
+              <a:t>2018-04-04</a:t>
             </a:fld>
             <a:endParaRPr lang="en-US"/>
           </a:p>
@@ -3352,7 +3348,7 @@
           <a:p>
             <a:fld id="{2D799662-88D0-4CED-9864-C2C5D3E3FDAB}" type="datetimeFigureOut">
               <a:rPr lang="en-US" smtClean="0"/>
-              <a:t>4/4/2018</a:t>
+              <a:t>2018-04-04</a:t>
             </a:fld>
             <a:endParaRPr lang="en-US"/>
           </a:p>
@@ -3603,7 +3599,7 @@
           <a:p>
             <a:fld id="{2D799662-88D0-4CED-9864-C2C5D3E3FDAB}" type="datetimeFigureOut">
               <a:rPr lang="en-US" smtClean="0"/>
-              <a:t>4/4/2018</a:t>
+              <a:t>2018-04-04</a:t>
             </a:fld>
             <a:endParaRPr lang="en-US"/>
           </a:p>
@@ -3900,7 +3896,7 @@
           <a:p>
             <a:fld id="{2D799662-88D0-4CED-9864-C2C5D3E3FDAB}" type="datetimeFigureOut">
               <a:rPr lang="en-US" smtClean="0"/>
-              <a:t>4/4/2018</a:t>
+              <a:t>2018-04-04</a:t>
             </a:fld>
             <a:endParaRPr lang="en-US"/>
           </a:p>
@@ -4342,7 +4338,7 @@
           <a:p>
             <a:fld id="{2D799662-88D0-4CED-9864-C2C5D3E3FDAB}" type="datetimeFigureOut">
               <a:rPr lang="en-US" smtClean="0"/>
-              <a:t>4/4/2018</a:t>
+              <a:t>2018-04-04</a:t>
             </a:fld>
             <a:endParaRPr lang="en-US"/>
           </a:p>
@@ -4460,7 +4456,7 @@
           <a:p>
             <a:fld id="{2D799662-88D0-4CED-9864-C2C5D3E3FDAB}" type="datetimeFigureOut">
               <a:rPr lang="en-US" smtClean="0"/>
-              <a:t>4/4/2018</a:t>
+              <a:t>2018-04-04</a:t>
             </a:fld>
             <a:endParaRPr lang="en-US"/>
           </a:p>
@@ -4555,7 +4551,7 @@
           <a:p>
             <a:fld id="{2D799662-88D0-4CED-9864-C2C5D3E3FDAB}" type="datetimeFigureOut">
               <a:rPr lang="en-US" smtClean="0"/>
-              <a:t>4/4/2018</a:t>
+              <a:t>2018-04-04</a:t>
             </a:fld>
             <a:endParaRPr lang="en-US"/>
           </a:p>
@@ -4838,7 +4834,7 @@
           <a:p>
             <a:fld id="{2D799662-88D0-4CED-9864-C2C5D3E3FDAB}" type="datetimeFigureOut">
               <a:rPr lang="en-US" smtClean="0"/>
-              <a:t>4/4/2018</a:t>
+              <a:t>2018-04-04</a:t>
             </a:fld>
             <a:endParaRPr lang="en-US"/>
           </a:p>
@@ -5129,7 +5125,7 @@
           <a:p>
             <a:fld id="{2D799662-88D0-4CED-9864-C2C5D3E3FDAB}" type="datetimeFigureOut">
               <a:rPr lang="en-US" smtClean="0"/>
-              <a:t>4/4/2018</a:t>
+              <a:t>2018-04-04</a:t>
             </a:fld>
             <a:endParaRPr lang="en-US"/>
           </a:p>
@@ -5659,7 +5655,7 @@
           <a:p>
             <a:fld id="{2D799662-88D0-4CED-9864-C2C5D3E3FDAB}" type="datetimeFigureOut">
               <a:rPr lang="en-US" smtClean="0"/>
-              <a:t>4/4/2018</a:t>
+              <a:t>2018-04-04</a:t>
             </a:fld>
             <a:endParaRPr lang="en-US"/>
           </a:p>
@@ -6369,14 +6365,14 @@
           <a:p>
             <a:r>
               <a:rPr lang="en-US" dirty="0"/>
-              <a:t>The Metadata Tool will operate in Sessions. </a:t>
+              <a:t>The Metadata Tool will operate in sessions. </a:t>
             </a:r>
           </a:p>
           <a:p>
             <a:pPr lvl="1"/>
             <a:r>
               <a:rPr lang="en-US" dirty="0"/>
-              <a:t>new/open/save Sessions</a:t>
+              <a:t>New/open/save sessions</a:t>
             </a:r>
           </a:p>
           <a:p>
@@ -6411,14 +6407,14 @@
             <a:pPr lvl="3"/>
             <a:r>
               <a:rPr lang="en-US" dirty="0"/>
-              <a:t>Jump to an Element in the tree</a:t>
+              <a:t>Jump to an element in the tree</a:t>
             </a:r>
           </a:p>
           <a:p>
             <a:pPr lvl="3"/>
             <a:r>
               <a:rPr lang="en-US" dirty="0"/>
-              <a:t>Progress visual ques</a:t>
+              <a:t>Visual cues for progress</a:t>
             </a:r>
           </a:p>
           <a:p>
@@ -6429,7 +6425,7 @@
                   <a:srgbClr val="FF0000"/>
                 </a:solidFill>
               </a:rPr>
-              <a:t>Empty Elements needing input </a:t>
+              <a:t>Empty elements needing input </a:t>
             </a:r>
           </a:p>
           <a:p>
@@ -6437,28 +6433,22 @@
             <a:r>
               <a:rPr lang="en-US" dirty="0">
                 <a:solidFill>
-                  <a:schemeClr val="accent3">
-                    <a:lumMod val="75000"/>
-                  </a:schemeClr>
+                  <a:srgbClr val="FF9900"/>
                 </a:solidFill>
               </a:rPr>
-              <a:t>Elements with content but unverified</a:t>
-            </a:r>
-            <a:endParaRPr lang="en-US" dirty="0"/>
+              <a:t>Elements with unverified content</a:t>
+            </a:r>
           </a:p>
           <a:p>
             <a:pPr lvl="4"/>
             <a:r>
               <a:rPr lang="en-US" dirty="0">
                 <a:solidFill>
-                  <a:schemeClr val="accent2">
-                    <a:lumMod val="50000"/>
-                  </a:schemeClr>
+                  <a:srgbClr val="00CC00"/>
                 </a:solidFill>
               </a:rPr>
               <a:t>Elements verified to be correct</a:t>
             </a:r>
-            <a:endParaRPr lang="en-US" dirty="0"/>
           </a:p>
           <a:p>
             <a:pPr lvl="2"/>
@@ -6471,7 +6461,7 @@
             <a:pPr lvl="3"/>
             <a:r>
               <a:rPr lang="en-US" dirty="0"/>
-              <a:t>Previous/next - modify Element contents in order</a:t>
+              <a:t>Previous/next - modify element contents in order</a:t>
             </a:r>
           </a:p>
           <a:p>
@@ -6598,7 +6588,7 @@
             <a:pPr lvl="1"/>
             <a:r>
               <a:rPr lang="en-US" dirty="0"/>
-              <a:t>Duplicate  tags that have unique information for a product need to appear in the Table of Contents with a unique identifier and treated carefully on export</a:t>
+              <a:t>Duplicate tags that have unique information for a product need to appear in the Table of Contents with a unique identifier and treated carefully on export</a:t>
             </a:r>
           </a:p>
           <a:p>
@@ -6611,14 +6601,14 @@
             <a:pPr lvl="1"/>
             <a:r>
               <a:rPr lang="en-US" dirty="0"/>
-              <a:t>Users need a visual queue to know the status of each element in the Table of Contents (empty, updated, verified)</a:t>
+              <a:t>Users need a visual cue to know the status of each element in the Table of Contents (empty, updated, verified)</a:t>
             </a:r>
           </a:p>
           <a:p>
             <a:pPr lvl="1"/>
             <a:r>
               <a:rPr lang="en-US" dirty="0"/>
-              <a:t>Ask a question, record the answer (a sort of wizard)</a:t>
+              <a:t>Ask the user a question, record their answer (like a ‘wizard’)</a:t>
             </a:r>
           </a:p>
           <a:p>
@@ -6712,7 +6702,7 @@
         <p:spPr>
           <a:xfrm>
             <a:off x="1484310" y="1066801"/>
-            <a:ext cx="10018713" cy="4724400"/>
+            <a:ext cx="10018713" cy="4968239"/>
           </a:xfrm>
         </p:spPr>
         <p:txBody>
@@ -6744,7 +6734,7 @@
             <a:pPr lvl="1"/>
             <a:r>
               <a:rPr lang="en-US" dirty="0"/>
-              <a:t>Display of knowledge sources in the form of Visual Queues</a:t>
+              <a:t>Display of knowledge sources in the form of visual cues</a:t>
             </a:r>
           </a:p>
           <a:p>
@@ -6771,7 +6761,7 @@
             <a:pPr lvl="1"/>
             <a:r>
               <a:rPr lang="en-US" dirty="0"/>
-              <a:t>Ideally, program use typically a linear flow through TOC elements. </a:t>
+              <a:t>Ideally, program typically uses a linear flow through the TOC elements. </a:t>
             </a:r>
           </a:p>
           <a:p>
@@ -6782,11 +6772,19 @@
             </a:r>
           </a:p>
           <a:p>
+            <a:pPr lvl="1"/>
+            <a:endParaRPr lang="en-US" dirty="0"/>
+          </a:p>
+          <a:p>
             <a:pPr marL="457200" lvl="1" indent="0" algn="ctr">
               <a:buNone/>
             </a:pPr>
             <a:r>
-              <a:rPr lang="en-US" dirty="0"/>
+              <a:rPr lang="en-US" dirty="0">
+                <a:solidFill>
+                  <a:srgbClr val="FF0000"/>
+                </a:solidFill>
+              </a:rPr>
               <a:t>WINNER - Repository</a:t>
             </a:r>
           </a:p>
@@ -6850,7 +6848,7 @@
           <a:p>
             <a:r>
               <a:rPr lang="en-US" dirty="0"/>
-              <a:t>Project Architecture</a:t>
+              <a:t>Project Architecture Diagram</a:t>
             </a:r>
           </a:p>
         </p:txBody>
@@ -8265,7 +8263,7 @@
           <a:noFill/>
         </p:spPr>
         <p:txBody>
-          <a:bodyPr wrap="none" rtlCol="0">
+          <a:bodyPr wrap="square" rtlCol="0">
             <a:spAutoFit/>
           </a:bodyPr>
           <a:lstStyle/>
@@ -8300,7 +8298,7 @@
           <a:noFill/>
         </p:spPr>
         <p:txBody>
-          <a:bodyPr wrap="none" rtlCol="0">
+          <a:bodyPr wrap="square" rtlCol="0">
             <a:spAutoFit/>
           </a:bodyPr>
           <a:lstStyle/>
@@ -8335,7 +8333,7 @@
           <a:noFill/>
         </p:spPr>
         <p:txBody>
-          <a:bodyPr wrap="none" rtlCol="0">
+          <a:bodyPr wrap="square" rtlCol="0">
             <a:spAutoFit/>
           </a:bodyPr>
           <a:lstStyle/>
@@ -8370,7 +8368,7 @@
           <a:noFill/>
         </p:spPr>
         <p:txBody>
-          <a:bodyPr wrap="none" rtlCol="0">
+          <a:bodyPr wrap="square" rtlCol="0">
             <a:spAutoFit/>
           </a:bodyPr>
           <a:lstStyle/>
@@ -8405,7 +8403,7 @@
           <a:noFill/>
         </p:spPr>
         <p:txBody>
-          <a:bodyPr wrap="none" rtlCol="0">
+          <a:bodyPr wrap="square" rtlCol="0">
             <a:spAutoFit/>
           </a:bodyPr>
           <a:lstStyle/>
@@ -8440,7 +8438,7 @@
           <a:noFill/>
         </p:spPr>
         <p:txBody>
-          <a:bodyPr wrap="none" rtlCol="0">
+          <a:bodyPr wrap="square" rtlCol="0">
             <a:spAutoFit/>
           </a:bodyPr>
           <a:lstStyle/>
@@ -8475,7 +8473,7 @@
           <a:noFill/>
         </p:spPr>
         <p:txBody>
-          <a:bodyPr wrap="none" rtlCol="0">
+          <a:bodyPr wrap="square" rtlCol="0">
             <a:spAutoFit/>
           </a:bodyPr>
           <a:lstStyle/>
@@ -8510,7 +8508,7 @@
           <a:noFill/>
         </p:spPr>
         <p:txBody>
-          <a:bodyPr wrap="none" rtlCol="0">
+          <a:bodyPr wrap="square" rtlCol="0">
             <a:spAutoFit/>
           </a:bodyPr>
           <a:lstStyle/>
@@ -8545,7 +8543,7 @@
           <a:noFill/>
         </p:spPr>
         <p:txBody>
-          <a:bodyPr wrap="none" rtlCol="0">
+          <a:bodyPr wrap="square" rtlCol="0">
             <a:spAutoFit/>
           </a:bodyPr>
           <a:lstStyle/>
@@ -8580,7 +8578,7 @@
           <a:noFill/>
         </p:spPr>
         <p:txBody>
-          <a:bodyPr wrap="none" rtlCol="0">
+          <a:bodyPr wrap="square" rtlCol="0">
             <a:spAutoFit/>
           </a:bodyPr>
           <a:lstStyle/>
@@ -8674,12 +8672,12 @@
         <p:spPr>
           <a:xfrm>
             <a:off x="1484310" y="1066801"/>
-            <a:ext cx="10018713" cy="4724400"/>
+            <a:ext cx="10018713" cy="5363094"/>
           </a:xfrm>
         </p:spPr>
         <p:txBody>
           <a:bodyPr anchor="t">
-            <a:normAutofit fontScale="92500" lnSpcReduction="10000"/>
+            <a:normAutofit/>
           </a:bodyPr>
           <a:lstStyle/>
           <a:p>
@@ -8698,7 +8696,7 @@
             <a:pPr lvl="1"/>
             <a:r>
               <a:rPr lang="en-US" dirty="0"/>
-              <a:t>Control of Behavior and Flow</a:t>
+              <a:t>Control of behavior and flow</a:t>
             </a:r>
           </a:p>
           <a:p>
@@ -8712,14 +8710,14 @@
             <a:pPr lvl="1"/>
             <a:r>
               <a:rPr lang="en-US" dirty="0"/>
-              <a:t>Designing the Node to capture requirements</a:t>
+              <a:t>Designing the node to capture requirements</a:t>
             </a:r>
           </a:p>
           <a:p>
             <a:pPr lvl="1"/>
             <a:r>
               <a:rPr lang="en-US" dirty="0"/>
-              <a:t>Duplication handling</a:t>
+              <a:t>Handling duplicates</a:t>
             </a:r>
           </a:p>
           <a:p>
@@ -8746,18 +8744,13 @@
             <a:pPr lvl="1"/>
             <a:r>
               <a:rPr lang="en-US" dirty="0"/>
-              <a:t>Time </a:t>
-            </a:r>
-            <a:r>
-              <a:rPr lang="en-US"/>
-              <a:t>/ Schedule</a:t>
-            </a:r>
-            <a:endParaRPr lang="en-US" dirty="0"/>
+              <a:t>Time / Schedule</a:t>
+            </a:r>
           </a:p>
           <a:p>
             <a:r>
               <a:rPr lang="en-US" dirty="0"/>
-              <a:t>Questions</a:t>
+              <a:t>Questions?</a:t>
             </a:r>
           </a:p>
         </p:txBody>

</xml_diff>